<commit_message>
ppt eddig 4.30p és legalább 9 kéne
</commit_message>
<xml_diff>
--- a/Dusza.pptx
+++ b/Dusza.pptx
@@ -4,10 +4,19 @@
   <p:sldMasterIdLst>
     <p:sldMasterId id="2147483648" r:id="rId1"/>
   </p:sldMasterIdLst>
+  <p:notesMasterIdLst>
+    <p:notesMasterId r:id="rId11"/>
+  </p:notesMasterIdLst>
   <p:sldIdLst>
     <p:sldId id="256" r:id="rId2"/>
     <p:sldId id="258" r:id="rId3"/>
-    <p:sldId id="257" r:id="rId4"/>
+    <p:sldId id="259" r:id="rId4"/>
+    <p:sldId id="260" r:id="rId5"/>
+    <p:sldId id="266" r:id="rId6"/>
+    <p:sldId id="267" r:id="rId7"/>
+    <p:sldId id="262" r:id="rId8"/>
+    <p:sldId id="268" r:id="rId9"/>
+    <p:sldId id="257" r:id="rId10"/>
   </p:sldIdLst>
   <p:sldSz cx="12192000" cy="6858000"/>
   <p:notesSz cx="6858000" cy="9144000"/>
@@ -114,6 +123,1319 @@
 </p:presentation>
 </file>
 
+<file path=ppt/notesMasters/notesMaster1.xml><?xml version="1.0" encoding="utf-8"?>
+<p:notesMaster xmlns:a="http://schemas.openxmlformats.org/drawingml/2006/main" xmlns:r="http://schemas.openxmlformats.org/officeDocument/2006/relationships" xmlns:p="http://schemas.openxmlformats.org/presentationml/2006/main">
+  <p:cSld>
+    <p:bg>
+      <p:bgRef idx="1001">
+        <a:schemeClr val="bg1"/>
+      </p:bgRef>
+    </p:bg>
+    <p:spTree>
+      <p:nvGrpSpPr>
+        <p:cNvPr id="1" name=""/>
+        <p:cNvGrpSpPr/>
+        <p:nvPr/>
+      </p:nvGrpSpPr>
+      <p:grpSpPr>
+        <a:xfrm>
+          <a:off x="0" y="0"/>
+          <a:ext cx="0" cy="0"/>
+          <a:chOff x="0" y="0"/>
+          <a:chExt cx="0" cy="0"/>
+        </a:xfrm>
+      </p:grpSpPr>
+      <p:sp>
+        <p:nvSpPr>
+          <p:cNvPr id="2" name="Élőfej helye 1"/>
+          <p:cNvSpPr>
+            <a:spLocks noGrp="1"/>
+          </p:cNvSpPr>
+          <p:nvPr>
+            <p:ph type="hdr" sz="quarter"/>
+          </p:nvPr>
+        </p:nvSpPr>
+        <p:spPr>
+          <a:xfrm>
+            <a:off x="0" y="0"/>
+            <a:ext cx="2971800" cy="458788"/>
+          </a:xfrm>
+          <a:prstGeom prst="rect">
+            <a:avLst/>
+          </a:prstGeom>
+        </p:spPr>
+        <p:txBody>
+          <a:bodyPr vert="horz" lIns="91440" tIns="45720" rIns="91440" bIns="45720" rtlCol="0"/>
+          <a:lstStyle>
+            <a:lvl1pPr algn="l">
+              <a:defRPr sz="1200"/>
+            </a:lvl1pPr>
+          </a:lstStyle>
+          <a:p>
+            <a:endParaRPr lang="hu-HU"/>
+          </a:p>
+        </p:txBody>
+      </p:sp>
+      <p:sp>
+        <p:nvSpPr>
+          <p:cNvPr id="3" name="Dátum helye 2"/>
+          <p:cNvSpPr>
+            <a:spLocks noGrp="1"/>
+          </p:cNvSpPr>
+          <p:nvPr>
+            <p:ph type="dt" idx="1"/>
+          </p:nvPr>
+        </p:nvSpPr>
+        <p:spPr>
+          <a:xfrm>
+            <a:off x="3884613" y="0"/>
+            <a:ext cx="2971800" cy="458788"/>
+          </a:xfrm>
+          <a:prstGeom prst="rect">
+            <a:avLst/>
+          </a:prstGeom>
+        </p:spPr>
+        <p:txBody>
+          <a:bodyPr vert="horz" lIns="91440" tIns="45720" rIns="91440" bIns="45720" rtlCol="0"/>
+          <a:lstStyle>
+            <a:lvl1pPr algn="r">
+              <a:defRPr sz="1200"/>
+            </a:lvl1pPr>
+          </a:lstStyle>
+          <a:p>
+            <a:fld id="{FEDDE4A5-532D-47B4-881A-1D200A9663CD}" type="datetimeFigureOut">
+              <a:rPr lang="hu-HU" smtClean="0"/>
+              <a:t>2024. 02. 21.</a:t>
+            </a:fld>
+            <a:endParaRPr lang="hu-HU"/>
+          </a:p>
+        </p:txBody>
+      </p:sp>
+      <p:sp>
+        <p:nvSpPr>
+          <p:cNvPr id="4" name="Diakép helye 3"/>
+          <p:cNvSpPr>
+            <a:spLocks noGrp="1" noRot="1" noChangeAspect="1"/>
+          </p:cNvSpPr>
+          <p:nvPr>
+            <p:ph type="sldImg" idx="2"/>
+          </p:nvPr>
+        </p:nvSpPr>
+        <p:spPr>
+          <a:xfrm>
+            <a:off x="685800" y="1143000"/>
+            <a:ext cx="5486400" cy="3086100"/>
+          </a:xfrm>
+          <a:prstGeom prst="rect">
+            <a:avLst/>
+          </a:prstGeom>
+          <a:noFill/>
+          <a:ln w="12700">
+            <a:solidFill>
+              <a:prstClr val="black"/>
+            </a:solidFill>
+          </a:ln>
+        </p:spPr>
+        <p:txBody>
+          <a:bodyPr vert="horz" lIns="91440" tIns="45720" rIns="91440" bIns="45720" rtlCol="0" anchor="ctr"/>
+          <a:lstStyle/>
+          <a:p>
+            <a:endParaRPr lang="hu-HU"/>
+          </a:p>
+        </p:txBody>
+      </p:sp>
+      <p:sp>
+        <p:nvSpPr>
+          <p:cNvPr id="5" name="Jegyzetek helye 4"/>
+          <p:cNvSpPr>
+            <a:spLocks noGrp="1"/>
+          </p:cNvSpPr>
+          <p:nvPr>
+            <p:ph type="body" sz="quarter" idx="3"/>
+          </p:nvPr>
+        </p:nvSpPr>
+        <p:spPr>
+          <a:xfrm>
+            <a:off x="685800" y="4400550"/>
+            <a:ext cx="5486400" cy="3600450"/>
+          </a:xfrm>
+          <a:prstGeom prst="rect">
+            <a:avLst/>
+          </a:prstGeom>
+        </p:spPr>
+        <p:txBody>
+          <a:bodyPr vert="horz" lIns="91440" tIns="45720" rIns="91440" bIns="45720" rtlCol="0"/>
+          <a:lstStyle/>
+          <a:p>
+            <a:pPr lvl="0"/>
+            <a:r>
+              <a:rPr lang="hu-HU"/>
+              <a:t>Mintaszöveg szerkesztése</a:t>
+            </a:r>
+          </a:p>
+          <a:p>
+            <a:pPr lvl="1"/>
+            <a:r>
+              <a:rPr lang="hu-HU"/>
+              <a:t>Második szint</a:t>
+            </a:r>
+          </a:p>
+          <a:p>
+            <a:pPr lvl="2"/>
+            <a:r>
+              <a:rPr lang="hu-HU"/>
+              <a:t>Harmadik szint</a:t>
+            </a:r>
+          </a:p>
+          <a:p>
+            <a:pPr lvl="3"/>
+            <a:r>
+              <a:rPr lang="hu-HU"/>
+              <a:t>Negyedik szint</a:t>
+            </a:r>
+          </a:p>
+          <a:p>
+            <a:pPr lvl="4"/>
+            <a:r>
+              <a:rPr lang="hu-HU"/>
+              <a:t>Ötödik szint</a:t>
+            </a:r>
+          </a:p>
+        </p:txBody>
+      </p:sp>
+      <p:sp>
+        <p:nvSpPr>
+          <p:cNvPr id="6" name="Élőláb helye 5"/>
+          <p:cNvSpPr>
+            <a:spLocks noGrp="1"/>
+          </p:cNvSpPr>
+          <p:nvPr>
+            <p:ph type="ftr" sz="quarter" idx="4"/>
+          </p:nvPr>
+        </p:nvSpPr>
+        <p:spPr>
+          <a:xfrm>
+            <a:off x="0" y="8685213"/>
+            <a:ext cx="2971800" cy="458787"/>
+          </a:xfrm>
+          <a:prstGeom prst="rect">
+            <a:avLst/>
+          </a:prstGeom>
+        </p:spPr>
+        <p:txBody>
+          <a:bodyPr vert="horz" lIns="91440" tIns="45720" rIns="91440" bIns="45720" rtlCol="0" anchor="b"/>
+          <a:lstStyle>
+            <a:lvl1pPr algn="l">
+              <a:defRPr sz="1200"/>
+            </a:lvl1pPr>
+          </a:lstStyle>
+          <a:p>
+            <a:endParaRPr lang="hu-HU"/>
+          </a:p>
+        </p:txBody>
+      </p:sp>
+      <p:sp>
+        <p:nvSpPr>
+          <p:cNvPr id="7" name="Dia számának helye 6"/>
+          <p:cNvSpPr>
+            <a:spLocks noGrp="1"/>
+          </p:cNvSpPr>
+          <p:nvPr>
+            <p:ph type="sldNum" sz="quarter" idx="5"/>
+          </p:nvPr>
+        </p:nvSpPr>
+        <p:spPr>
+          <a:xfrm>
+            <a:off x="3884613" y="8685213"/>
+            <a:ext cx="2971800" cy="458787"/>
+          </a:xfrm>
+          <a:prstGeom prst="rect">
+            <a:avLst/>
+          </a:prstGeom>
+        </p:spPr>
+        <p:txBody>
+          <a:bodyPr vert="horz" lIns="91440" tIns="45720" rIns="91440" bIns="45720" rtlCol="0" anchor="b"/>
+          <a:lstStyle>
+            <a:lvl1pPr algn="r">
+              <a:defRPr sz="1200"/>
+            </a:lvl1pPr>
+          </a:lstStyle>
+          <a:p>
+            <a:fld id="{926A2D96-851A-462A-B91C-6CCB6CCD6CA4}" type="slidenum">
+              <a:rPr lang="hu-HU" smtClean="0"/>
+              <a:t>‹#›</a:t>
+            </a:fld>
+            <a:endParaRPr lang="hu-HU"/>
+          </a:p>
+        </p:txBody>
+      </p:sp>
+    </p:spTree>
+    <p:extLst>
+      <p:ext uri="{BB962C8B-B14F-4D97-AF65-F5344CB8AC3E}">
+        <p14:creationId xmlns:p14="http://schemas.microsoft.com/office/powerpoint/2010/main" val="433391621"/>
+      </p:ext>
+    </p:extLst>
+  </p:cSld>
+  <p:clrMap bg1="lt1" tx1="dk1" bg2="lt2" tx2="dk2" accent1="accent1" accent2="accent2" accent3="accent3" accent4="accent4" accent5="accent5" accent6="accent6" hlink="hlink" folHlink="folHlink"/>
+  <p:notesStyle>
+    <a:lvl1pPr marL="0" algn="l" defTabSz="914400" rtl="0" eaLnBrk="1" latinLnBrk="0" hangingPunct="1">
+      <a:defRPr sz="1200" kern="1200">
+        <a:solidFill>
+          <a:schemeClr val="tx1"/>
+        </a:solidFill>
+        <a:latin typeface="+mn-lt"/>
+        <a:ea typeface="+mn-ea"/>
+        <a:cs typeface="+mn-cs"/>
+      </a:defRPr>
+    </a:lvl1pPr>
+    <a:lvl2pPr marL="457200" algn="l" defTabSz="914400" rtl="0" eaLnBrk="1" latinLnBrk="0" hangingPunct="1">
+      <a:defRPr sz="1200" kern="1200">
+        <a:solidFill>
+          <a:schemeClr val="tx1"/>
+        </a:solidFill>
+        <a:latin typeface="+mn-lt"/>
+        <a:ea typeface="+mn-ea"/>
+        <a:cs typeface="+mn-cs"/>
+      </a:defRPr>
+    </a:lvl2pPr>
+    <a:lvl3pPr marL="914400" algn="l" defTabSz="914400" rtl="0" eaLnBrk="1" latinLnBrk="0" hangingPunct="1">
+      <a:defRPr sz="1200" kern="1200">
+        <a:solidFill>
+          <a:schemeClr val="tx1"/>
+        </a:solidFill>
+        <a:latin typeface="+mn-lt"/>
+        <a:ea typeface="+mn-ea"/>
+        <a:cs typeface="+mn-cs"/>
+      </a:defRPr>
+    </a:lvl3pPr>
+    <a:lvl4pPr marL="1371600" algn="l" defTabSz="914400" rtl="0" eaLnBrk="1" latinLnBrk="0" hangingPunct="1">
+      <a:defRPr sz="1200" kern="1200">
+        <a:solidFill>
+          <a:schemeClr val="tx1"/>
+        </a:solidFill>
+        <a:latin typeface="+mn-lt"/>
+        <a:ea typeface="+mn-ea"/>
+        <a:cs typeface="+mn-cs"/>
+      </a:defRPr>
+    </a:lvl4pPr>
+    <a:lvl5pPr marL="1828800" algn="l" defTabSz="914400" rtl="0" eaLnBrk="1" latinLnBrk="0" hangingPunct="1">
+      <a:defRPr sz="1200" kern="1200">
+        <a:solidFill>
+          <a:schemeClr val="tx1"/>
+        </a:solidFill>
+        <a:latin typeface="+mn-lt"/>
+        <a:ea typeface="+mn-ea"/>
+        <a:cs typeface="+mn-cs"/>
+      </a:defRPr>
+    </a:lvl5pPr>
+    <a:lvl6pPr marL="2286000" algn="l" defTabSz="914400" rtl="0" eaLnBrk="1" latinLnBrk="0" hangingPunct="1">
+      <a:defRPr sz="1200" kern="1200">
+        <a:solidFill>
+          <a:schemeClr val="tx1"/>
+        </a:solidFill>
+        <a:latin typeface="+mn-lt"/>
+        <a:ea typeface="+mn-ea"/>
+        <a:cs typeface="+mn-cs"/>
+      </a:defRPr>
+    </a:lvl6pPr>
+    <a:lvl7pPr marL="2743200" algn="l" defTabSz="914400" rtl="0" eaLnBrk="1" latinLnBrk="0" hangingPunct="1">
+      <a:defRPr sz="1200" kern="1200">
+        <a:solidFill>
+          <a:schemeClr val="tx1"/>
+        </a:solidFill>
+        <a:latin typeface="+mn-lt"/>
+        <a:ea typeface="+mn-ea"/>
+        <a:cs typeface="+mn-cs"/>
+      </a:defRPr>
+    </a:lvl7pPr>
+    <a:lvl8pPr marL="3200400" algn="l" defTabSz="914400" rtl="0" eaLnBrk="1" latinLnBrk="0" hangingPunct="1">
+      <a:defRPr sz="1200" kern="1200">
+        <a:solidFill>
+          <a:schemeClr val="tx1"/>
+        </a:solidFill>
+        <a:latin typeface="+mn-lt"/>
+        <a:ea typeface="+mn-ea"/>
+        <a:cs typeface="+mn-cs"/>
+      </a:defRPr>
+    </a:lvl8pPr>
+    <a:lvl9pPr marL="3657600" algn="l" defTabSz="914400" rtl="0" eaLnBrk="1" latinLnBrk="0" hangingPunct="1">
+      <a:defRPr sz="1200" kern="1200">
+        <a:solidFill>
+          <a:schemeClr val="tx1"/>
+        </a:solidFill>
+        <a:latin typeface="+mn-lt"/>
+        <a:ea typeface="+mn-ea"/>
+        <a:cs typeface="+mn-cs"/>
+      </a:defRPr>
+    </a:lvl9pPr>
+  </p:notesStyle>
+</p:notesMaster>
+</file>
+
+<file path=ppt/notesSlides/notesSlide1.xml><?xml version="1.0" encoding="utf-8"?>
+<p:notes xmlns:a="http://schemas.openxmlformats.org/drawingml/2006/main" xmlns:r="http://schemas.openxmlformats.org/officeDocument/2006/relationships" xmlns:p="http://schemas.openxmlformats.org/presentationml/2006/main">
+  <p:cSld>
+    <p:spTree>
+      <p:nvGrpSpPr>
+        <p:cNvPr id="1" name=""/>
+        <p:cNvGrpSpPr/>
+        <p:nvPr/>
+      </p:nvGrpSpPr>
+      <p:grpSpPr>
+        <a:xfrm>
+          <a:off x="0" y="0"/>
+          <a:ext cx="0" cy="0"/>
+          <a:chOff x="0" y="0"/>
+          <a:chExt cx="0" cy="0"/>
+        </a:xfrm>
+      </p:grpSpPr>
+      <p:sp>
+        <p:nvSpPr>
+          <p:cNvPr id="2" name="Diakép helye 1"/>
+          <p:cNvSpPr>
+            <a:spLocks noGrp="1" noRot="1" noChangeAspect="1"/>
+          </p:cNvSpPr>
+          <p:nvPr>
+            <p:ph type="sldImg"/>
+          </p:nvPr>
+        </p:nvSpPr>
+        <p:spPr/>
+      </p:sp>
+      <p:sp>
+        <p:nvSpPr>
+          <p:cNvPr id="3" name="Jegyzetek helye 2"/>
+          <p:cNvSpPr>
+            <a:spLocks noGrp="1"/>
+          </p:cNvSpPr>
+          <p:nvPr>
+            <p:ph type="body" idx="1"/>
+          </p:nvPr>
+        </p:nvSpPr>
+        <p:spPr/>
+        <p:txBody>
+          <a:bodyPr/>
+          <a:lstStyle/>
+          <a:p>
+            <a:r>
+              <a:rPr lang="hu-HU" dirty="0"/>
+              <a:t>Regisztrációnál és bejelentkezésnél is a jelszavak és a megerősítő jelszó is csillaggal el van rejtve, de lehetősége van a felhasználónak a jelszavak megtekintésére a „smiley” ikonra kattintva.</a:t>
+            </a:r>
+          </a:p>
+          <a:p>
+            <a:r>
+              <a:rPr lang="hu-HU" dirty="0"/>
+              <a:t>Felhasználónév és megjelenítési név csak 50 karakter hosszúságú lehet maximálisan, minimálisan pedig 4 karakter hosszúságú és regisztráció után a megjelenített név automatikusan a felhasználónév lesz.</a:t>
+            </a:r>
+          </a:p>
+          <a:p>
+            <a:r>
+              <a:rPr lang="hu-HU" dirty="0"/>
+              <a:t>A minimum jelszó hossza 8 karakter.</a:t>
+            </a:r>
+          </a:p>
+        </p:txBody>
+      </p:sp>
+      <p:sp>
+        <p:nvSpPr>
+          <p:cNvPr id="4" name="Dia számának helye 3"/>
+          <p:cNvSpPr>
+            <a:spLocks noGrp="1"/>
+          </p:cNvSpPr>
+          <p:nvPr>
+            <p:ph type="sldNum" sz="quarter" idx="5"/>
+          </p:nvPr>
+        </p:nvSpPr>
+        <p:spPr/>
+        <p:txBody>
+          <a:bodyPr/>
+          <a:lstStyle/>
+          <a:p>
+            <a:fld id="{926A2D96-851A-462A-B91C-6CCB6CCD6CA4}" type="slidenum">
+              <a:rPr lang="hu-HU" smtClean="0"/>
+              <a:t>2</a:t>
+            </a:fld>
+            <a:endParaRPr lang="hu-HU"/>
+          </a:p>
+        </p:txBody>
+      </p:sp>
+    </p:spTree>
+    <p:extLst>
+      <p:ext uri="{BB962C8B-B14F-4D97-AF65-F5344CB8AC3E}">
+        <p14:creationId xmlns:p14="http://schemas.microsoft.com/office/powerpoint/2010/main" val="2642777530"/>
+      </p:ext>
+    </p:extLst>
+  </p:cSld>
+  <p:clrMapOvr>
+    <a:masterClrMapping/>
+  </p:clrMapOvr>
+</p:notes>
+</file>
+
+<file path=ppt/notesSlides/notesSlide2.xml><?xml version="1.0" encoding="utf-8"?>
+<p:notes xmlns:a="http://schemas.openxmlformats.org/drawingml/2006/main" xmlns:r="http://schemas.openxmlformats.org/officeDocument/2006/relationships" xmlns:p="http://schemas.openxmlformats.org/presentationml/2006/main">
+  <p:cSld>
+    <p:spTree>
+      <p:nvGrpSpPr>
+        <p:cNvPr id="1" name=""/>
+        <p:cNvGrpSpPr/>
+        <p:nvPr/>
+      </p:nvGrpSpPr>
+      <p:grpSpPr>
+        <a:xfrm>
+          <a:off x="0" y="0"/>
+          <a:ext cx="0" cy="0"/>
+          <a:chOff x="0" y="0"/>
+          <a:chExt cx="0" cy="0"/>
+        </a:xfrm>
+      </p:grpSpPr>
+      <p:sp>
+        <p:nvSpPr>
+          <p:cNvPr id="2" name="Diakép helye 1"/>
+          <p:cNvSpPr>
+            <a:spLocks noGrp="1" noRot="1" noChangeAspect="1"/>
+          </p:cNvSpPr>
+          <p:nvPr>
+            <p:ph type="sldImg"/>
+          </p:nvPr>
+        </p:nvSpPr>
+        <p:spPr/>
+      </p:sp>
+      <p:sp>
+        <p:nvSpPr>
+          <p:cNvPr id="3" name="Jegyzetek helye 2"/>
+          <p:cNvSpPr>
+            <a:spLocks noGrp="1"/>
+          </p:cNvSpPr>
+          <p:nvPr>
+            <p:ph type="body" idx="1"/>
+          </p:nvPr>
+        </p:nvSpPr>
+        <p:spPr/>
+        <p:txBody>
+          <a:bodyPr/>
+          <a:lstStyle/>
+          <a:p>
+            <a:pPr marL="0" marR="0" lvl="0" indent="0" algn="l" defTabSz="914400" rtl="0" eaLnBrk="1" fontAlgn="auto" latinLnBrk="0" hangingPunct="1">
+              <a:lnSpc>
+                <a:spcPct val="100000"/>
+              </a:lnSpc>
+              <a:spcBef>
+                <a:spcPts val="0"/>
+              </a:spcBef>
+              <a:spcAft>
+                <a:spcPts val="0"/>
+              </a:spcAft>
+              <a:buClrTx/>
+              <a:buSzTx/>
+              <a:buFontTx/>
+              <a:buNone/>
+              <a:tabLst/>
+              <a:defRPr/>
+            </a:pPr>
+            <a:r>
+              <a:rPr lang="hu-HU" dirty="0"/>
+              <a:t>Ezt egy új fájl, a „felhasznalok.txt” segítségével tehettük meg, amiben a felhasználó neve, a </a:t>
+            </a:r>
+            <a:r>
+              <a:rPr lang="hu-HU" dirty="0" err="1"/>
+              <a:t>jelszava</a:t>
+            </a:r>
+            <a:r>
+              <a:rPr lang="hu-HU" dirty="0"/>
+              <a:t> titkosítva, és a megjelenített neve található.</a:t>
+            </a:r>
+          </a:p>
+          <a:p>
+            <a:pPr marL="0" marR="0" lvl="0" indent="0" algn="l" defTabSz="914400" rtl="0" eaLnBrk="1" fontAlgn="auto" latinLnBrk="0" hangingPunct="1">
+              <a:lnSpc>
+                <a:spcPct val="100000"/>
+              </a:lnSpc>
+              <a:spcBef>
+                <a:spcPts val="0"/>
+              </a:spcBef>
+              <a:spcAft>
+                <a:spcPts val="0"/>
+              </a:spcAft>
+              <a:buClrTx/>
+              <a:buSzTx/>
+              <a:buFontTx/>
+              <a:buNone/>
+              <a:tabLst/>
+              <a:defRPr/>
+            </a:pPr>
+            <a:r>
+              <a:rPr lang="hu-HU" dirty="0"/>
+              <a:t>A megjelenített nevét megváltoztathatja bármikor, ezt például a rangsor kiírásánál használjuk, hogy mások is láthassák.</a:t>
+            </a:r>
+          </a:p>
+          <a:p>
+            <a:pPr marL="0" marR="0" lvl="0" indent="0" algn="l" defTabSz="914400" rtl="0" eaLnBrk="1" fontAlgn="auto" latinLnBrk="0" hangingPunct="1">
+              <a:lnSpc>
+                <a:spcPct val="100000"/>
+              </a:lnSpc>
+              <a:spcBef>
+                <a:spcPts val="0"/>
+              </a:spcBef>
+              <a:spcAft>
+                <a:spcPts val="0"/>
+              </a:spcAft>
+              <a:buClrTx/>
+              <a:buSzTx/>
+              <a:buFontTx/>
+              <a:buNone/>
+              <a:tabLst/>
+              <a:defRPr/>
+            </a:pPr>
+            <a:r>
+              <a:rPr lang="hu-HU" dirty="0"/>
+              <a:t>A felhasználó jelszavát egy külső könyvtár, </a:t>
+            </a:r>
+            <a:r>
+              <a:rPr lang="hu-HU" b="1" dirty="0" err="1"/>
+              <a:t>hashlib</a:t>
+            </a:r>
+            <a:r>
+              <a:rPr lang="hu-HU" dirty="0"/>
+              <a:t> használatával </a:t>
+            </a:r>
+            <a:r>
+              <a:rPr lang="hu-HU" dirty="0" err="1"/>
+              <a:t>titkosítjuk</a:t>
+            </a:r>
+            <a:r>
+              <a:rPr lang="hu-HU" dirty="0"/>
+              <a:t>. A </a:t>
+            </a:r>
+            <a:r>
+              <a:rPr lang="hu-HU" dirty="0" err="1"/>
+              <a:t>hashlib</a:t>
+            </a:r>
+            <a:r>
+              <a:rPr lang="hu-HU" dirty="0"/>
+              <a:t> lehetővé teszi az egyes szövegek </a:t>
+            </a:r>
+            <a:r>
+              <a:rPr lang="hu-HU" b="0" dirty="0">
+                <a:solidFill>
+                  <a:srgbClr val="6A9955"/>
+                </a:solidFill>
+                <a:effectLst/>
+                <a:latin typeface="Consolas" panose="020B0609020204030204" pitchFamily="49" charset="0"/>
+              </a:rPr>
+              <a:t>SHA-256</a:t>
+            </a:r>
+            <a:r>
+              <a:rPr lang="hu-HU" b="0" dirty="0">
+                <a:solidFill>
+                  <a:srgbClr val="CCCCCC"/>
+                </a:solidFill>
+                <a:effectLst/>
+                <a:latin typeface="Consolas" panose="020B0609020204030204" pitchFamily="49" charset="0"/>
+              </a:rPr>
+              <a:t>-es titkosítását és a begépelt jelszavak titkosított mását bejelentkezéskor összehasonlítjuk a fájlban található másával.</a:t>
+            </a:r>
+          </a:p>
+          <a:p>
+            <a:pPr marL="0" marR="0" lvl="0" indent="0" algn="l" defTabSz="914400" rtl="0" eaLnBrk="1" fontAlgn="auto" latinLnBrk="0" hangingPunct="1">
+              <a:lnSpc>
+                <a:spcPct val="100000"/>
+              </a:lnSpc>
+              <a:spcBef>
+                <a:spcPts val="0"/>
+              </a:spcBef>
+              <a:spcAft>
+                <a:spcPts val="0"/>
+              </a:spcAft>
+              <a:buClrTx/>
+              <a:buSzTx/>
+              <a:buFontTx/>
+              <a:buNone/>
+              <a:tabLst/>
+              <a:defRPr/>
+            </a:pPr>
+            <a:endParaRPr lang="hu-HU" dirty="0"/>
+          </a:p>
+        </p:txBody>
+      </p:sp>
+      <p:sp>
+        <p:nvSpPr>
+          <p:cNvPr id="4" name="Dia számának helye 3"/>
+          <p:cNvSpPr>
+            <a:spLocks noGrp="1"/>
+          </p:cNvSpPr>
+          <p:nvPr>
+            <p:ph type="sldNum" sz="quarter" idx="5"/>
+          </p:nvPr>
+        </p:nvSpPr>
+        <p:spPr/>
+        <p:txBody>
+          <a:bodyPr/>
+          <a:lstStyle/>
+          <a:p>
+            <a:fld id="{926A2D96-851A-462A-B91C-6CCB6CCD6CA4}" type="slidenum">
+              <a:rPr lang="hu-HU" smtClean="0"/>
+              <a:t>3</a:t>
+            </a:fld>
+            <a:endParaRPr lang="hu-HU"/>
+          </a:p>
+        </p:txBody>
+      </p:sp>
+    </p:spTree>
+    <p:extLst>
+      <p:ext uri="{BB962C8B-B14F-4D97-AF65-F5344CB8AC3E}">
+        <p14:creationId xmlns:p14="http://schemas.microsoft.com/office/powerpoint/2010/main" val="2525457561"/>
+      </p:ext>
+    </p:extLst>
+  </p:cSld>
+  <p:clrMapOvr>
+    <a:masterClrMapping/>
+  </p:clrMapOvr>
+</p:notes>
+</file>
+
+<file path=ppt/notesSlides/notesSlide3.xml><?xml version="1.0" encoding="utf-8"?>
+<p:notes xmlns:a="http://schemas.openxmlformats.org/drawingml/2006/main" xmlns:r="http://schemas.openxmlformats.org/officeDocument/2006/relationships" xmlns:p="http://schemas.openxmlformats.org/presentationml/2006/main">
+  <p:cSld>
+    <p:spTree>
+      <p:nvGrpSpPr>
+        <p:cNvPr id="1" name=""/>
+        <p:cNvGrpSpPr/>
+        <p:nvPr/>
+      </p:nvGrpSpPr>
+      <p:grpSpPr>
+        <a:xfrm>
+          <a:off x="0" y="0"/>
+          <a:ext cx="0" cy="0"/>
+          <a:chOff x="0" y="0"/>
+          <a:chExt cx="0" cy="0"/>
+        </a:xfrm>
+      </p:grpSpPr>
+      <p:sp>
+        <p:nvSpPr>
+          <p:cNvPr id="2" name="Diakép helye 1"/>
+          <p:cNvSpPr>
+            <a:spLocks noGrp="1" noRot="1" noChangeAspect="1"/>
+          </p:cNvSpPr>
+          <p:nvPr>
+            <p:ph type="sldImg"/>
+          </p:nvPr>
+        </p:nvSpPr>
+        <p:spPr/>
+      </p:sp>
+      <p:sp>
+        <p:nvSpPr>
+          <p:cNvPr id="3" name="Jegyzetek helye 2"/>
+          <p:cNvSpPr>
+            <a:spLocks noGrp="1"/>
+          </p:cNvSpPr>
+          <p:nvPr>
+            <p:ph type="body" idx="1"/>
+          </p:nvPr>
+        </p:nvSpPr>
+        <p:spPr/>
+        <p:txBody>
+          <a:bodyPr/>
+          <a:lstStyle/>
+          <a:p>
+            <a:pPr marL="0" marR="0" lvl="0" indent="0" algn="l" defTabSz="914400" rtl="0" eaLnBrk="1" fontAlgn="auto" latinLnBrk="0" hangingPunct="1">
+              <a:lnSpc>
+                <a:spcPct val="100000"/>
+              </a:lnSpc>
+              <a:spcBef>
+                <a:spcPts val="0"/>
+              </a:spcBef>
+              <a:spcAft>
+                <a:spcPts val="0"/>
+              </a:spcAft>
+              <a:buClrTx/>
+              <a:buSzTx/>
+              <a:buFontTx/>
+              <a:buNone/>
+              <a:tabLst/>
+              <a:defRPr/>
+            </a:pPr>
+            <a:r>
+              <a:rPr lang="hu-HU" dirty="0">
+                <a:solidFill>
+                  <a:schemeClr val="bg1"/>
+                </a:solidFill>
+              </a:rPr>
+              <a:t>Megjelenítés PyQt5 külső könyvtár segítségével.</a:t>
+            </a:r>
+          </a:p>
+          <a:p>
+            <a:pPr marL="0" marR="0" lvl="0" indent="0" algn="l" defTabSz="914400" rtl="0" eaLnBrk="1" fontAlgn="auto" latinLnBrk="0" hangingPunct="1">
+              <a:lnSpc>
+                <a:spcPct val="100000"/>
+              </a:lnSpc>
+              <a:spcBef>
+                <a:spcPts val="0"/>
+              </a:spcBef>
+              <a:spcAft>
+                <a:spcPts val="0"/>
+              </a:spcAft>
+              <a:buClrTx/>
+              <a:buSzTx/>
+              <a:buFontTx/>
+              <a:buNone/>
+              <a:tabLst/>
+              <a:defRPr/>
+            </a:pPr>
+            <a:r>
+              <a:rPr lang="hu-HU" dirty="0">
+                <a:solidFill>
+                  <a:schemeClr val="bg1"/>
+                </a:solidFill>
+              </a:rPr>
+              <a:t>Belépés után a szerepválasztáshoz érünk el, ahol a megjelenített nevünket tudjuk megváltoztatni a fogaskerék ikonra kattintva (előző dián látható), vagy egy szerepkört (szervezőt vagy fogadót) kiválasztani is tudunk.</a:t>
+            </a:r>
+          </a:p>
+        </p:txBody>
+      </p:sp>
+      <p:sp>
+        <p:nvSpPr>
+          <p:cNvPr id="4" name="Dia számának helye 3"/>
+          <p:cNvSpPr>
+            <a:spLocks noGrp="1"/>
+          </p:cNvSpPr>
+          <p:nvPr>
+            <p:ph type="sldNum" sz="quarter" idx="5"/>
+          </p:nvPr>
+        </p:nvSpPr>
+        <p:spPr/>
+        <p:txBody>
+          <a:bodyPr/>
+          <a:lstStyle/>
+          <a:p>
+            <a:fld id="{926A2D96-851A-462A-B91C-6CCB6CCD6CA4}" type="slidenum">
+              <a:rPr lang="hu-HU" smtClean="0"/>
+              <a:t>4</a:t>
+            </a:fld>
+            <a:endParaRPr lang="hu-HU"/>
+          </a:p>
+        </p:txBody>
+      </p:sp>
+    </p:spTree>
+    <p:extLst>
+      <p:ext uri="{BB962C8B-B14F-4D97-AF65-F5344CB8AC3E}">
+        <p14:creationId xmlns:p14="http://schemas.microsoft.com/office/powerpoint/2010/main" val="3772852235"/>
+      </p:ext>
+    </p:extLst>
+  </p:cSld>
+  <p:clrMapOvr>
+    <a:masterClrMapping/>
+  </p:clrMapOvr>
+</p:notes>
+</file>
+
+<file path=ppt/notesSlides/notesSlide4.xml><?xml version="1.0" encoding="utf-8"?>
+<p:notes xmlns:a="http://schemas.openxmlformats.org/drawingml/2006/main" xmlns:r="http://schemas.openxmlformats.org/officeDocument/2006/relationships" xmlns:p="http://schemas.openxmlformats.org/presentationml/2006/main">
+  <p:cSld>
+    <p:spTree>
+      <p:nvGrpSpPr>
+        <p:cNvPr id="1" name=""/>
+        <p:cNvGrpSpPr/>
+        <p:nvPr/>
+      </p:nvGrpSpPr>
+      <p:grpSpPr>
+        <a:xfrm>
+          <a:off x="0" y="0"/>
+          <a:ext cx="0" cy="0"/>
+          <a:chOff x="0" y="0"/>
+          <a:chExt cx="0" cy="0"/>
+        </a:xfrm>
+      </p:grpSpPr>
+      <p:sp>
+        <p:nvSpPr>
+          <p:cNvPr id="2" name="Diakép helye 1"/>
+          <p:cNvSpPr>
+            <a:spLocks noGrp="1" noRot="1" noChangeAspect="1"/>
+          </p:cNvSpPr>
+          <p:nvPr>
+            <p:ph type="sldImg"/>
+          </p:nvPr>
+        </p:nvSpPr>
+        <p:spPr/>
+      </p:sp>
+      <p:sp>
+        <p:nvSpPr>
+          <p:cNvPr id="3" name="Jegyzetek helye 2"/>
+          <p:cNvSpPr>
+            <a:spLocks noGrp="1"/>
+          </p:cNvSpPr>
+          <p:nvPr>
+            <p:ph type="body" idx="1"/>
+          </p:nvPr>
+        </p:nvSpPr>
+        <p:spPr/>
+        <p:txBody>
+          <a:bodyPr/>
+          <a:lstStyle/>
+          <a:p>
+            <a:pPr marL="0" marR="0" lvl="0" indent="0" algn="l" defTabSz="914400" rtl="0" eaLnBrk="1" fontAlgn="auto" latinLnBrk="0" hangingPunct="1">
+              <a:lnSpc>
+                <a:spcPct val="100000"/>
+              </a:lnSpc>
+              <a:spcBef>
+                <a:spcPts val="0"/>
+              </a:spcBef>
+              <a:spcAft>
+                <a:spcPts val="0"/>
+              </a:spcAft>
+              <a:buClrTx/>
+              <a:buSzTx/>
+              <a:buFontTx/>
+              <a:buNone/>
+              <a:tabLst/>
+              <a:defRPr/>
+            </a:pPr>
+            <a:r>
+              <a:rPr lang="hu-HU" dirty="0"/>
+              <a:t>A le nem zárt játékokat, amiket a felhasználó készített, egy összesített oldalon látja, pont miután kiválasztotta a szervező szerepkört.</a:t>
+            </a:r>
+          </a:p>
+          <a:p>
+            <a:r>
+              <a:rPr lang="hu-HU" dirty="0"/>
+              <a:t>Játék létrehozásához, mint az első fordulón, itt is leteszteli a program a helyes adatbevitelt. Mint bármelyik többi adatbevitelkor a program a futása során. Újabb alanyokat és eseményeket a „plusz” ikonra kattintva tudunk hozzáadni.</a:t>
+            </a:r>
+          </a:p>
+          <a:p>
+            <a:r>
+              <a:rPr lang="hu-HU" dirty="0"/>
+              <a:t>Maximálisan 50 karakter hosszúságú lehet a játék megnevezése és az alanyok, és események egyenként.</a:t>
+            </a:r>
+          </a:p>
+          <a:p>
+            <a:r>
+              <a:rPr lang="hu-HU" dirty="0"/>
+              <a:t>Az egyes le nem zárt, felhasználó által létrehozott játékoknál lévő „Játék lezárása” gombbal lehetősége van a játék lezárására, a játék eredményei bevitele után.</a:t>
+            </a:r>
+          </a:p>
+        </p:txBody>
+      </p:sp>
+      <p:sp>
+        <p:nvSpPr>
+          <p:cNvPr id="4" name="Dia számának helye 3"/>
+          <p:cNvSpPr>
+            <a:spLocks noGrp="1"/>
+          </p:cNvSpPr>
+          <p:nvPr>
+            <p:ph type="sldNum" sz="quarter" idx="5"/>
+          </p:nvPr>
+        </p:nvSpPr>
+        <p:spPr/>
+        <p:txBody>
+          <a:bodyPr/>
+          <a:lstStyle/>
+          <a:p>
+            <a:fld id="{926A2D96-851A-462A-B91C-6CCB6CCD6CA4}" type="slidenum">
+              <a:rPr lang="hu-HU" smtClean="0"/>
+              <a:t>5</a:t>
+            </a:fld>
+            <a:endParaRPr lang="hu-HU"/>
+          </a:p>
+        </p:txBody>
+      </p:sp>
+    </p:spTree>
+    <p:extLst>
+      <p:ext uri="{BB962C8B-B14F-4D97-AF65-F5344CB8AC3E}">
+        <p14:creationId xmlns:p14="http://schemas.microsoft.com/office/powerpoint/2010/main" val="929770756"/>
+      </p:ext>
+    </p:extLst>
+  </p:cSld>
+  <p:clrMapOvr>
+    <a:masterClrMapping/>
+  </p:clrMapOvr>
+</p:notes>
+</file>
+
+<file path=ppt/notesSlides/notesSlide5.xml><?xml version="1.0" encoding="utf-8"?>
+<p:notes xmlns:a="http://schemas.openxmlformats.org/drawingml/2006/main" xmlns:r="http://schemas.openxmlformats.org/officeDocument/2006/relationships" xmlns:p="http://schemas.openxmlformats.org/presentationml/2006/main">
+  <p:cSld>
+    <p:spTree>
+      <p:nvGrpSpPr>
+        <p:cNvPr id="1" name=""/>
+        <p:cNvGrpSpPr/>
+        <p:nvPr/>
+      </p:nvGrpSpPr>
+      <p:grpSpPr>
+        <a:xfrm>
+          <a:off x="0" y="0"/>
+          <a:ext cx="0" cy="0"/>
+          <a:chOff x="0" y="0"/>
+          <a:chExt cx="0" cy="0"/>
+        </a:xfrm>
+      </p:grpSpPr>
+      <p:sp>
+        <p:nvSpPr>
+          <p:cNvPr id="2" name="Diakép helye 1"/>
+          <p:cNvSpPr>
+            <a:spLocks noGrp="1" noRot="1" noChangeAspect="1"/>
+          </p:cNvSpPr>
+          <p:nvPr>
+            <p:ph type="sldImg"/>
+          </p:nvPr>
+        </p:nvSpPr>
+        <p:spPr/>
+      </p:sp>
+      <p:sp>
+        <p:nvSpPr>
+          <p:cNvPr id="3" name="Jegyzetek helye 2"/>
+          <p:cNvSpPr>
+            <a:spLocks noGrp="1"/>
+          </p:cNvSpPr>
+          <p:nvPr>
+            <p:ph type="body" idx="1"/>
+          </p:nvPr>
+        </p:nvSpPr>
+        <p:spPr/>
+        <p:txBody>
+          <a:bodyPr/>
+          <a:lstStyle/>
+          <a:p>
+            <a:pPr marL="0" marR="0" lvl="0" indent="0" algn="l" defTabSz="914400" rtl="0" eaLnBrk="1" fontAlgn="auto" latinLnBrk="0" hangingPunct="1">
+              <a:lnSpc>
+                <a:spcPct val="100000"/>
+              </a:lnSpc>
+              <a:spcBef>
+                <a:spcPts val="0"/>
+              </a:spcBef>
+              <a:spcAft>
+                <a:spcPts val="0"/>
+              </a:spcAft>
+              <a:buClrTx/>
+              <a:buSzTx/>
+              <a:buFontTx/>
+              <a:buNone/>
+              <a:tabLst/>
+              <a:defRPr/>
+            </a:pPr>
+            <a:r>
+              <a:rPr lang="hu-HU" dirty="0"/>
+              <a:t>A le nem zárt összes játékot, amikre szavazhat, egy összesített oldalon látja, pont miután kiválasztotta a fogadó szerepkört.</a:t>
+            </a:r>
+          </a:p>
+          <a:p>
+            <a:pPr marL="0" marR="0" lvl="0" indent="0" algn="l" defTabSz="914400" rtl="0" eaLnBrk="1" fontAlgn="auto" latinLnBrk="0" hangingPunct="1">
+              <a:lnSpc>
+                <a:spcPct val="100000"/>
+              </a:lnSpc>
+              <a:spcBef>
+                <a:spcPts val="0"/>
+              </a:spcBef>
+              <a:spcAft>
+                <a:spcPts val="0"/>
+              </a:spcAft>
+              <a:buClrTx/>
+              <a:buSzTx/>
+              <a:buFontTx/>
+              <a:buNone/>
+              <a:tabLst/>
+              <a:defRPr/>
+            </a:pPr>
+            <a:r>
+              <a:rPr lang="hu-HU" dirty="0"/>
+              <a:t>Minden játék után egy „Fogadás” gomb található, melynek segítségével fogadásokat adhatunk le.</a:t>
+            </a:r>
+          </a:p>
+          <a:p>
+            <a:pPr marL="0" marR="0" lvl="0" indent="0" algn="l" defTabSz="914400" rtl="0" eaLnBrk="1" fontAlgn="auto" latinLnBrk="0" hangingPunct="1">
+              <a:lnSpc>
+                <a:spcPct val="100000"/>
+              </a:lnSpc>
+              <a:spcBef>
+                <a:spcPts val="0"/>
+              </a:spcBef>
+              <a:spcAft>
+                <a:spcPts val="0"/>
+              </a:spcAft>
+              <a:buClrTx/>
+              <a:buSzTx/>
+              <a:buFontTx/>
+              <a:buNone/>
+              <a:tabLst/>
+              <a:defRPr/>
+            </a:pPr>
+            <a:endParaRPr lang="hu-HU" dirty="0"/>
+          </a:p>
+        </p:txBody>
+      </p:sp>
+      <p:sp>
+        <p:nvSpPr>
+          <p:cNvPr id="4" name="Dia számának helye 3"/>
+          <p:cNvSpPr>
+            <a:spLocks noGrp="1"/>
+          </p:cNvSpPr>
+          <p:nvPr>
+            <p:ph type="sldNum" sz="quarter" idx="5"/>
+          </p:nvPr>
+        </p:nvSpPr>
+        <p:spPr/>
+        <p:txBody>
+          <a:bodyPr/>
+          <a:lstStyle/>
+          <a:p>
+            <a:fld id="{926A2D96-851A-462A-B91C-6CCB6CCD6CA4}" type="slidenum">
+              <a:rPr lang="hu-HU" smtClean="0"/>
+              <a:t>6</a:t>
+            </a:fld>
+            <a:endParaRPr lang="hu-HU"/>
+          </a:p>
+        </p:txBody>
+      </p:sp>
+    </p:spTree>
+    <p:extLst>
+      <p:ext uri="{BB962C8B-B14F-4D97-AF65-F5344CB8AC3E}">
+        <p14:creationId xmlns:p14="http://schemas.microsoft.com/office/powerpoint/2010/main" val="824055884"/>
+      </p:ext>
+    </p:extLst>
+  </p:cSld>
+  <p:clrMapOvr>
+    <a:masterClrMapping/>
+  </p:clrMapOvr>
+</p:notes>
+</file>
+
+<file path=ppt/notesSlides/notesSlide6.xml><?xml version="1.0" encoding="utf-8"?>
+<p:notes xmlns:a="http://schemas.openxmlformats.org/drawingml/2006/main" xmlns:r="http://schemas.openxmlformats.org/officeDocument/2006/relationships" xmlns:p="http://schemas.openxmlformats.org/presentationml/2006/main">
+  <p:cSld>
+    <p:spTree>
+      <p:nvGrpSpPr>
+        <p:cNvPr id="1" name=""/>
+        <p:cNvGrpSpPr/>
+        <p:nvPr/>
+      </p:nvGrpSpPr>
+      <p:grpSpPr>
+        <a:xfrm>
+          <a:off x="0" y="0"/>
+          <a:ext cx="0" cy="0"/>
+          <a:chOff x="0" y="0"/>
+          <a:chExt cx="0" cy="0"/>
+        </a:xfrm>
+      </p:grpSpPr>
+      <p:sp>
+        <p:nvSpPr>
+          <p:cNvPr id="2" name="Diakép helye 1"/>
+          <p:cNvSpPr>
+            <a:spLocks noGrp="1" noRot="1" noChangeAspect="1"/>
+          </p:cNvSpPr>
+          <p:nvPr>
+            <p:ph type="sldImg"/>
+          </p:nvPr>
+        </p:nvSpPr>
+        <p:spPr/>
+      </p:sp>
+      <p:sp>
+        <p:nvSpPr>
+          <p:cNvPr id="3" name="Jegyzetek helye 2"/>
+          <p:cNvSpPr>
+            <a:spLocks noGrp="1"/>
+          </p:cNvSpPr>
+          <p:nvPr>
+            <p:ph type="body" idx="1"/>
+          </p:nvPr>
+        </p:nvSpPr>
+        <p:spPr/>
+        <p:txBody>
+          <a:bodyPr/>
+          <a:lstStyle/>
+          <a:p>
+            <a:r>
+              <a:rPr lang="hu-HU" dirty="0"/>
+              <a:t>A </a:t>
+            </a:r>
+            <a:r>
+              <a:rPr lang="hu-HU" dirty="0" err="1"/>
+              <a:t>Github</a:t>
+            </a:r>
+            <a:r>
+              <a:rPr lang="hu-HU" dirty="0"/>
+              <a:t> segítségével tudtuk a program forráskódját és egyéb fájlokat, amik ahhoz szükségesek (</a:t>
+            </a:r>
+            <a:r>
+              <a:rPr lang="hu-HU" dirty="0" err="1"/>
+              <a:t>pl</a:t>
+            </a:r>
+            <a:r>
+              <a:rPr lang="hu-HU" dirty="0"/>
+              <a:t>: ikonokat) megosztani egymással.</a:t>
+            </a:r>
+          </a:p>
+          <a:p>
+            <a:r>
+              <a:rPr lang="hu-HU" dirty="0"/>
+              <a:t>A </a:t>
+            </a:r>
+            <a:r>
+              <a:rPr lang="hu-HU" dirty="0" err="1"/>
+              <a:t>Trello-val</a:t>
+            </a:r>
+            <a:r>
+              <a:rPr lang="hu-HU" dirty="0"/>
+              <a:t> a közös munkák és feladatok beosztását tudtuk megosztani egymással és bővebben kifejteni, hogy mi is a feladat.</a:t>
+            </a:r>
+          </a:p>
+          <a:p>
+            <a:r>
+              <a:rPr lang="hu-HU" dirty="0"/>
+              <a:t>A </a:t>
+            </a:r>
+            <a:r>
+              <a:rPr lang="hu-HU" dirty="0" err="1"/>
+              <a:t>Figma</a:t>
+            </a:r>
+            <a:r>
+              <a:rPr lang="hu-HU" dirty="0"/>
+              <a:t> a grafikus és felhasználóbarát felület közös létrehozásában és megosztásában volt nagy segítség nekünk.</a:t>
+            </a:r>
+          </a:p>
+        </p:txBody>
+      </p:sp>
+      <p:sp>
+        <p:nvSpPr>
+          <p:cNvPr id="4" name="Dia számának helye 3"/>
+          <p:cNvSpPr>
+            <a:spLocks noGrp="1"/>
+          </p:cNvSpPr>
+          <p:nvPr>
+            <p:ph type="sldNum" sz="quarter" idx="5"/>
+          </p:nvPr>
+        </p:nvSpPr>
+        <p:spPr/>
+        <p:txBody>
+          <a:bodyPr/>
+          <a:lstStyle/>
+          <a:p>
+            <a:fld id="{926A2D96-851A-462A-B91C-6CCB6CCD6CA4}" type="slidenum">
+              <a:rPr lang="hu-HU" smtClean="0"/>
+              <a:t>7</a:t>
+            </a:fld>
+            <a:endParaRPr lang="hu-HU"/>
+          </a:p>
+        </p:txBody>
+      </p:sp>
+    </p:spTree>
+    <p:extLst>
+      <p:ext uri="{BB962C8B-B14F-4D97-AF65-F5344CB8AC3E}">
+        <p14:creationId xmlns:p14="http://schemas.microsoft.com/office/powerpoint/2010/main" val="555619384"/>
+      </p:ext>
+    </p:extLst>
+  </p:cSld>
+  <p:clrMapOvr>
+    <a:masterClrMapping/>
+  </p:clrMapOvr>
+</p:notes>
+</file>
+
+<file path=ppt/notesSlides/notesSlide7.xml><?xml version="1.0" encoding="utf-8"?>
+<p:notes xmlns:a="http://schemas.openxmlformats.org/drawingml/2006/main" xmlns:r="http://schemas.openxmlformats.org/officeDocument/2006/relationships" xmlns:p="http://schemas.openxmlformats.org/presentationml/2006/main">
+  <p:cSld>
+    <p:spTree>
+      <p:nvGrpSpPr>
+        <p:cNvPr id="1" name="">
+          <a:extLst>
+            <a:ext uri="{FF2B5EF4-FFF2-40B4-BE49-F238E27FC236}">
+              <a16:creationId xmlns:a16="http://schemas.microsoft.com/office/drawing/2014/main" id="{182F469F-631D-D0CE-72EB-3C3530931844}"/>
+            </a:ext>
+          </a:extLst>
+        </p:cNvPr>
+        <p:cNvGrpSpPr/>
+        <p:nvPr/>
+      </p:nvGrpSpPr>
+      <p:grpSpPr>
+        <a:xfrm>
+          <a:off x="0" y="0"/>
+          <a:ext cx="0" cy="0"/>
+          <a:chOff x="0" y="0"/>
+          <a:chExt cx="0" cy="0"/>
+        </a:xfrm>
+      </p:grpSpPr>
+      <p:sp>
+        <p:nvSpPr>
+          <p:cNvPr id="2" name="Diakép helye 1">
+            <a:extLst>
+              <a:ext uri="{FF2B5EF4-FFF2-40B4-BE49-F238E27FC236}">
+                <a16:creationId xmlns:a16="http://schemas.microsoft.com/office/drawing/2014/main" id="{E8A768A2-4277-8142-519F-2737B1C5E828}"/>
+              </a:ext>
+            </a:extLst>
+          </p:cNvPr>
+          <p:cNvSpPr>
+            <a:spLocks noGrp="1" noRot="1" noChangeAspect="1"/>
+          </p:cNvSpPr>
+          <p:nvPr>
+            <p:ph type="sldImg"/>
+          </p:nvPr>
+        </p:nvSpPr>
+        <p:spPr/>
+      </p:sp>
+      <p:sp>
+        <p:nvSpPr>
+          <p:cNvPr id="3" name="Jegyzetek helye 2">
+            <a:extLst>
+              <a:ext uri="{FF2B5EF4-FFF2-40B4-BE49-F238E27FC236}">
+                <a16:creationId xmlns:a16="http://schemas.microsoft.com/office/drawing/2014/main" id="{F01A74B4-016F-9B1B-34F5-81BEF760E537}"/>
+              </a:ext>
+            </a:extLst>
+          </p:cNvPr>
+          <p:cNvSpPr>
+            <a:spLocks noGrp="1"/>
+          </p:cNvSpPr>
+          <p:nvPr>
+            <p:ph type="body" idx="1"/>
+          </p:nvPr>
+        </p:nvSpPr>
+        <p:spPr/>
+        <p:txBody>
+          <a:bodyPr/>
+          <a:lstStyle/>
+          <a:p>
+            <a:endParaRPr lang="hu-HU" dirty="0"/>
+          </a:p>
+        </p:txBody>
+      </p:sp>
+      <p:sp>
+        <p:nvSpPr>
+          <p:cNvPr id="4" name="Dia számának helye 3">
+            <a:extLst>
+              <a:ext uri="{FF2B5EF4-FFF2-40B4-BE49-F238E27FC236}">
+                <a16:creationId xmlns:a16="http://schemas.microsoft.com/office/drawing/2014/main" id="{6C09F926-036C-E0D9-6A49-8083CA239A34}"/>
+              </a:ext>
+            </a:extLst>
+          </p:cNvPr>
+          <p:cNvSpPr>
+            <a:spLocks noGrp="1"/>
+          </p:cNvSpPr>
+          <p:nvPr>
+            <p:ph type="sldNum" sz="quarter" idx="5"/>
+          </p:nvPr>
+        </p:nvSpPr>
+        <p:spPr/>
+        <p:txBody>
+          <a:bodyPr/>
+          <a:lstStyle/>
+          <a:p>
+            <a:fld id="{926A2D96-851A-462A-B91C-6CCB6CCD6CA4}" type="slidenum">
+              <a:rPr lang="hu-HU" smtClean="0"/>
+              <a:t>8</a:t>
+            </a:fld>
+            <a:endParaRPr lang="hu-HU"/>
+          </a:p>
+        </p:txBody>
+      </p:sp>
+    </p:spTree>
+    <p:extLst>
+      <p:ext uri="{BB962C8B-B14F-4D97-AF65-F5344CB8AC3E}">
+        <p14:creationId xmlns:p14="http://schemas.microsoft.com/office/powerpoint/2010/main" val="393930695"/>
+      </p:ext>
+    </p:extLst>
+  </p:cSld>
+  <p:clrMapOvr>
+    <a:masterClrMapping/>
+  </p:clrMapOvr>
+</p:notes>
+</file>
+
 <file path=ppt/slideLayouts/slideLayout1.xml><?xml version="1.0" encoding="utf-8"?>
 <p:sldLayout xmlns:a="http://schemas.openxmlformats.org/drawingml/2006/main" xmlns:r="http://schemas.openxmlformats.org/officeDocument/2006/relationships" xmlns:p="http://schemas.openxmlformats.org/presentationml/2006/main" type="title" preserve="1">
   <p:cSld name="Címdia">
@@ -261,7 +1583,7 @@
           <a:p>
             <a:fld id="{9A905408-B006-406D-B0A6-634079E1BEC0}" type="datetimeFigureOut">
               <a:rPr lang="hu-HU" smtClean="0"/>
-              <a:t>2024. 02. 19.</a:t>
+              <a:t>2024. 02. 21.</a:t>
             </a:fld>
             <a:endParaRPr lang="hu-HU"/>
           </a:p>
@@ -459,7 +1781,7 @@
           <a:p>
             <a:fld id="{9A905408-B006-406D-B0A6-634079E1BEC0}" type="datetimeFigureOut">
               <a:rPr lang="hu-HU" smtClean="0"/>
-              <a:t>2024. 02. 19.</a:t>
+              <a:t>2024. 02. 21.</a:t>
             </a:fld>
             <a:endParaRPr lang="hu-HU"/>
           </a:p>
@@ -667,7 +1989,7 @@
           <a:p>
             <a:fld id="{9A905408-B006-406D-B0A6-634079E1BEC0}" type="datetimeFigureOut">
               <a:rPr lang="hu-HU" smtClean="0"/>
-              <a:t>2024. 02. 19.</a:t>
+              <a:t>2024. 02. 21.</a:t>
             </a:fld>
             <a:endParaRPr lang="hu-HU"/>
           </a:p>
@@ -865,7 +2187,7 @@
           <a:p>
             <a:fld id="{9A905408-B006-406D-B0A6-634079E1BEC0}" type="datetimeFigureOut">
               <a:rPr lang="hu-HU" smtClean="0"/>
-              <a:t>2024. 02. 19.</a:t>
+              <a:t>2024. 02. 21.</a:t>
             </a:fld>
             <a:endParaRPr lang="hu-HU"/>
           </a:p>
@@ -1140,7 +2462,7 @@
           <a:p>
             <a:fld id="{9A905408-B006-406D-B0A6-634079E1BEC0}" type="datetimeFigureOut">
               <a:rPr lang="hu-HU" smtClean="0"/>
-              <a:t>2024. 02. 19.</a:t>
+              <a:t>2024. 02. 21.</a:t>
             </a:fld>
             <a:endParaRPr lang="hu-HU"/>
           </a:p>
@@ -1405,7 +2727,7 @@
           <a:p>
             <a:fld id="{9A905408-B006-406D-B0A6-634079E1BEC0}" type="datetimeFigureOut">
               <a:rPr lang="hu-HU" smtClean="0"/>
-              <a:t>2024. 02. 19.</a:t>
+              <a:t>2024. 02. 21.</a:t>
             </a:fld>
             <a:endParaRPr lang="hu-HU"/>
           </a:p>
@@ -1817,7 +3139,7 @@
           <a:p>
             <a:fld id="{9A905408-B006-406D-B0A6-634079E1BEC0}" type="datetimeFigureOut">
               <a:rPr lang="hu-HU" smtClean="0"/>
-              <a:t>2024. 02. 19.</a:t>
+              <a:t>2024. 02. 21.</a:t>
             </a:fld>
             <a:endParaRPr lang="hu-HU"/>
           </a:p>
@@ -1958,7 +3280,7 @@
           <a:p>
             <a:fld id="{9A905408-B006-406D-B0A6-634079E1BEC0}" type="datetimeFigureOut">
               <a:rPr lang="hu-HU" smtClean="0"/>
-              <a:t>2024. 02. 19.</a:t>
+              <a:t>2024. 02. 21.</a:t>
             </a:fld>
             <a:endParaRPr lang="hu-HU"/>
           </a:p>
@@ -2071,7 +3393,7 @@
           <a:p>
             <a:fld id="{9A905408-B006-406D-B0A6-634079E1BEC0}" type="datetimeFigureOut">
               <a:rPr lang="hu-HU" smtClean="0"/>
-              <a:t>2024. 02. 19.</a:t>
+              <a:t>2024. 02. 21.</a:t>
             </a:fld>
             <a:endParaRPr lang="hu-HU"/>
           </a:p>
@@ -2382,7 +3704,7 @@
           <a:p>
             <a:fld id="{9A905408-B006-406D-B0A6-634079E1BEC0}" type="datetimeFigureOut">
               <a:rPr lang="hu-HU" smtClean="0"/>
-              <a:t>2024. 02. 19.</a:t>
+              <a:t>2024. 02. 21.</a:t>
             </a:fld>
             <a:endParaRPr lang="hu-HU"/>
           </a:p>
@@ -2670,7 +3992,7 @@
           <a:p>
             <a:fld id="{9A905408-B006-406D-B0A6-634079E1BEC0}" type="datetimeFigureOut">
               <a:rPr lang="hu-HU" smtClean="0"/>
-              <a:t>2024. 02. 19.</a:t>
+              <a:t>2024. 02. 21.</a:t>
             </a:fld>
             <a:endParaRPr lang="hu-HU"/>
           </a:p>
@@ -2911,7 +4233,7 @@
           <a:p>
             <a:fld id="{9A905408-B006-406D-B0A6-634079E1BEC0}" type="datetimeFigureOut">
               <a:rPr lang="hu-HU" smtClean="0"/>
-              <a:t>2024. 02. 19.</a:t>
+              <a:t>2024. 02. 21.</a:t>
             </a:fld>
             <a:endParaRPr lang="hu-HU"/>
           </a:p>
@@ -3314,6 +4636,14 @@
 <file path=ppt/slides/slide1.xml><?xml version="1.0" encoding="utf-8"?>
 <p:sld xmlns:a="http://schemas.openxmlformats.org/drawingml/2006/main" xmlns:r="http://schemas.openxmlformats.org/officeDocument/2006/relationships" xmlns:p="http://schemas.openxmlformats.org/presentationml/2006/main">
   <p:cSld>
+    <p:bg>
+      <p:bgPr>
+        <a:solidFill>
+          <a:schemeClr val="tx1"/>
+        </a:solidFill>
+        <a:effectLst/>
+      </p:bgPr>
+    </p:bg>
     <p:spTree>
       <p:nvGrpSpPr>
         <p:cNvPr id="1" name=""/>
@@ -3328,6 +4658,192 @@
           <a:chExt cx="0" cy="0"/>
         </a:xfrm>
       </p:grpSpPr>
+      <p:sp useBgFill="1">
+        <p:nvSpPr>
+          <p:cNvPr id="10" name="Rectangle 9">
+            <a:extLst>
+              <a:ext uri="{FF2B5EF4-FFF2-40B4-BE49-F238E27FC236}">
+                <a16:creationId xmlns:a16="http://schemas.microsoft.com/office/drawing/2014/main" id="{C1DD1A8A-57D5-4A81-AD04-532B043C5611}"/>
+              </a:ext>
+              <a:ext uri="{C183D7F6-B498-43B3-948B-1728B52AA6E4}">
+                <adec:decorative xmlns:adec="http://schemas.microsoft.com/office/drawing/2017/decorative" val="1"/>
+              </a:ext>
+            </a:extLst>
+          </p:cNvPr>
+          <p:cNvSpPr>
+            <a:spLocks noGrp="1" noRot="1" noChangeAspect="1" noMove="1" noResize="1" noEditPoints="1" noAdjustHandles="1" noChangeArrowheads="1" noChangeShapeType="1" noTextEdit="1"/>
+          </p:cNvSpPr>
+          <p:nvPr>
+            <p:extLst>
+              <p:ext uri="{386F3935-93C4-4BCD-93E2-E3B085C9AB24}">
+                <p16:designElem xmlns:p16="http://schemas.microsoft.com/office/powerpoint/2015/main" val="1"/>
+              </p:ext>
+            </p:extLst>
+          </p:nvPr>
+        </p:nvSpPr>
+        <p:spPr>
+          <a:xfrm>
+            <a:off x="-1" y="0"/>
+            <a:ext cx="12188952" cy="6858000"/>
+          </a:xfrm>
+          <a:prstGeom prst="rect">
+            <a:avLst/>
+          </a:prstGeom>
+          <a:ln>
+            <a:noFill/>
+          </a:ln>
+        </p:spPr>
+        <p:style>
+          <a:lnRef idx="2">
+            <a:schemeClr val="accent1">
+              <a:shade val="50000"/>
+            </a:schemeClr>
+          </a:lnRef>
+          <a:fillRef idx="1">
+            <a:schemeClr val="accent1"/>
+          </a:fillRef>
+          <a:effectRef idx="0">
+            <a:schemeClr val="accent1"/>
+          </a:effectRef>
+          <a:fontRef idx="minor">
+            <a:schemeClr val="lt1"/>
+          </a:fontRef>
+        </p:style>
+        <p:txBody>
+          <a:bodyPr rtlCol="0" anchor="ctr"/>
+          <a:lstStyle/>
+          <a:p>
+            <a:pPr algn="ctr"/>
+            <a:endParaRPr lang="en-US"/>
+          </a:p>
+        </p:txBody>
+      </p:sp>
+      <p:pic>
+        <p:nvPicPr>
+          <p:cNvPr id="5" name="Kép 4" descr="A képen kör, sárga, Színesség látható&#10;&#10;Automatikusan generált leírás">
+            <a:extLst>
+              <a:ext uri="{FF2B5EF4-FFF2-40B4-BE49-F238E27FC236}">
+                <a16:creationId xmlns:a16="http://schemas.microsoft.com/office/drawing/2014/main" id="{E4DAEDD9-EC0A-7866-D231-92650F78A940}"/>
+              </a:ext>
+            </a:extLst>
+          </p:cNvPr>
+          <p:cNvPicPr>
+            <a:picLocks noChangeAspect="1"/>
+          </p:cNvPicPr>
+          <p:nvPr/>
+        </p:nvPicPr>
+        <p:blipFill rotWithShape="1">
+          <a:blip r:embed="rId2">
+            <a:extLst>
+              <a:ext uri="{28A0092B-C50C-407E-A947-70E740481C1C}">
+                <a14:useLocalDpi xmlns:a14="http://schemas.microsoft.com/office/drawing/2010/main" val="0"/>
+              </a:ext>
+            </a:extLst>
+          </a:blip>
+          <a:srcRect t="20188" b="23562"/>
+          <a:stretch/>
+        </p:blipFill>
+        <p:spPr>
+          <a:xfrm>
+            <a:off x="-3047" y="10"/>
+            <a:ext cx="12191999" cy="6857990"/>
+          </a:xfrm>
+          <a:prstGeom prst="rect">
+            <a:avLst/>
+          </a:prstGeom>
+        </p:spPr>
+      </p:pic>
+      <p:sp>
+        <p:nvSpPr>
+          <p:cNvPr id="12" name="Rectangle 11">
+            <a:extLst>
+              <a:ext uri="{FF2B5EF4-FFF2-40B4-BE49-F238E27FC236}">
+                <a16:creationId xmlns:a16="http://schemas.microsoft.com/office/drawing/2014/main" id="{007891EC-4501-44ED-A8C8-B11B6DB767AB}"/>
+              </a:ext>
+              <a:ext uri="{C183D7F6-B498-43B3-948B-1728B52AA6E4}">
+                <adec:decorative xmlns:adec="http://schemas.microsoft.com/office/drawing/2017/decorative" val="1"/>
+              </a:ext>
+            </a:extLst>
+          </p:cNvPr>
+          <p:cNvSpPr>
+            <a:spLocks noGrp="1" noRot="1" noChangeAspect="1" noMove="1" noResize="1" noEditPoints="1" noAdjustHandles="1" noChangeArrowheads="1" noChangeShapeType="1" noTextEdit="1"/>
+          </p:cNvSpPr>
+          <p:nvPr>
+            <p:extLst>
+              <p:ext uri="{386F3935-93C4-4BCD-93E2-E3B085C9AB24}">
+                <p16:designElem xmlns:p16="http://schemas.microsoft.com/office/powerpoint/2015/main" val="1"/>
+              </p:ext>
+            </p:extLst>
+          </p:nvPr>
+        </p:nvSpPr>
+        <p:spPr>
+          <a:xfrm>
+            <a:off x="0" y="2207602"/>
+            <a:ext cx="12191999" cy="3162146"/>
+          </a:xfrm>
+          <a:prstGeom prst="rect">
+            <a:avLst/>
+          </a:prstGeom>
+          <a:gradFill flip="none" rotWithShape="1">
+            <a:gsLst>
+              <a:gs pos="0">
+                <a:srgbClr val="000000">
+                  <a:alpha val="0"/>
+                </a:srgbClr>
+              </a:gs>
+              <a:gs pos="25000">
+                <a:srgbClr val="000000">
+                  <a:alpha val="15000"/>
+                </a:srgbClr>
+              </a:gs>
+              <a:gs pos="75000">
+                <a:srgbClr val="000000">
+                  <a:alpha val="15000"/>
+                </a:srgbClr>
+              </a:gs>
+              <a:gs pos="50000">
+                <a:srgbClr val="000000">
+                  <a:alpha val="30000"/>
+                </a:srgbClr>
+              </a:gs>
+              <a:gs pos="100000">
+                <a:srgbClr val="000000">
+                  <a:alpha val="0"/>
+                </a:srgbClr>
+              </a:gs>
+            </a:gsLst>
+            <a:lin ang="16200000" scaled="1"/>
+            <a:tileRect/>
+          </a:gradFill>
+          <a:ln>
+            <a:noFill/>
+          </a:ln>
+        </p:spPr>
+        <p:style>
+          <a:lnRef idx="2">
+            <a:schemeClr val="accent1">
+              <a:shade val="50000"/>
+            </a:schemeClr>
+          </a:lnRef>
+          <a:fillRef idx="1">
+            <a:schemeClr val="accent1"/>
+          </a:fillRef>
+          <a:effectRef idx="0">
+            <a:schemeClr val="accent1"/>
+          </a:effectRef>
+          <a:fontRef idx="minor">
+            <a:schemeClr val="lt1"/>
+          </a:fontRef>
+        </p:style>
+        <p:txBody>
+          <a:bodyPr rtlCol="0" anchor="ctr"/>
+          <a:lstStyle/>
+          <a:p>
+            <a:pPr algn="ctr"/>
+            <a:endParaRPr lang="en-US"/>
+          </a:p>
+        </p:txBody>
+      </p:sp>
       <p:sp>
         <p:nvSpPr>
           <p:cNvPr id="2" name="Cím 1">
@@ -3344,21 +4860,62 @@
             <p:ph type="ctrTitle"/>
           </p:nvPr>
         </p:nvSpPr>
-        <p:spPr/>
-        <p:txBody>
-          <a:bodyPr/>
-          <a:lstStyle/>
-          <a:p>
-            <a:r>
-              <a:rPr lang="hu-HU" dirty="0"/>
+        <p:spPr>
+          <a:xfrm>
+            <a:off x="1097280" y="325550"/>
+            <a:ext cx="10058400" cy="3574778"/>
+          </a:xfrm>
+          <a:effectLst>
+            <a:outerShdw blurRad="50800" dist="38100" dir="2700000" algn="tl" rotWithShape="0">
+              <a:prstClr val="black">
+                <a:alpha val="40000"/>
+              </a:prstClr>
+            </a:outerShdw>
+          </a:effectLst>
+        </p:spPr>
+        <p:txBody>
+          <a:bodyPr>
+            <a:normAutofit/>
+          </a:bodyPr>
+          <a:lstStyle/>
+          <a:p>
+            <a:r>
+              <a:rPr lang="hu-HU" sz="5200" b="1" dirty="0">
+                <a:ln w="31750">
+                  <a:solidFill>
+                    <a:schemeClr val="tx1"/>
+                  </a:solidFill>
+                </a:ln>
+                <a:solidFill>
+                  <a:srgbClr val="FFFF00"/>
+                </a:solidFill>
+              </a:rPr>
               <a:t>Fogadás </a:t>
             </a:r>
             <a:r>
-              <a:rPr lang="hu-HU" dirty="0" err="1"/>
+              <a:rPr lang="hu-HU" sz="5200" b="1" dirty="0" err="1">
+                <a:ln w="31750">
+                  <a:solidFill>
+                    <a:schemeClr val="tx1"/>
+                  </a:solidFill>
+                </a:ln>
+                <a:solidFill>
+                  <a:srgbClr val="FFFF00"/>
+                </a:solidFill>
+              </a:rPr>
               <a:t>managger</a:t>
             </a:r>
             <a:r>
-              <a:rPr lang="hu-HU" dirty="0"/>
+              <a:rPr lang="hu-HU" sz="5200" b="1" dirty="0">
+                <a:ln w="31750">
+                  <a:solidFill>
+                    <a:schemeClr val="tx1"/>
+                  </a:solidFill>
+                </a:ln>
+                <a:solidFill>
+                  <a:srgbClr val="FFFF00"/>
+                </a:solidFill>
+              </a:rPr>
               <a:t> 2000</a:t>
             </a:r>
           </a:p>
@@ -3380,12 +4937,49 @@
             <p:ph type="subTitle" idx="1"/>
           </p:nvPr>
         </p:nvSpPr>
-        <p:spPr/>
-        <p:txBody>
-          <a:bodyPr/>
-          <a:lstStyle/>
-          <a:p>
-            <a:endParaRPr lang="hu-HU"/>
+        <p:spPr>
+          <a:xfrm>
+            <a:off x="1100051" y="4072043"/>
+            <a:ext cx="10058400" cy="1282707"/>
+          </a:xfrm>
+          <a:effectLst>
+            <a:outerShdw blurRad="50800" dist="38100" dir="2700000" algn="tl" rotWithShape="0">
+              <a:prstClr val="black">
+                <a:alpha val="40000"/>
+              </a:prstClr>
+            </a:outerShdw>
+          </a:effectLst>
+        </p:spPr>
+        <p:txBody>
+          <a:bodyPr>
+            <a:normAutofit/>
+          </a:bodyPr>
+          <a:lstStyle/>
+          <a:p>
+            <a:r>
+              <a:rPr lang="hu-HU" dirty="0">
+                <a:solidFill>
+                  <a:srgbClr val="FFFFFF"/>
+                </a:solidFill>
+              </a:rPr>
+              <a:t>A </a:t>
+            </a:r>
+            <a:r>
+              <a:rPr lang="hu-HU" dirty="0" err="1">
+                <a:solidFill>
+                  <a:srgbClr val="FFFFFF"/>
+                </a:solidFill>
+              </a:rPr>
+              <a:t>Sigmakik</a:t>
+            </a:r>
+            <a:r>
+              <a:rPr lang="hu-HU" dirty="0">
+                <a:solidFill>
+                  <a:srgbClr val="FFFFFF"/>
+                </a:solidFill>
+              </a:rPr>
+              <a:t> csapattól</a:t>
+            </a:r>
           </a:p>
         </p:txBody>
       </p:sp>
@@ -3408,7 +5002,7 @@
     <p:bg>
       <p:bgPr>
         <a:solidFill>
-          <a:schemeClr val="bg1"/>
+          <a:srgbClr val="1F1F1F"/>
         </a:solidFill>
         <a:effectLst/>
       </p:bgPr>
@@ -3517,9 +5111,18 @@
           <a:p>
             <a:pPr algn="ctr"/>
             <a:r>
-              <a:rPr lang="en-US" sz="6600"/>
+              <a:rPr lang="en-US" sz="6600" dirty="0" err="1">
+                <a:solidFill>
+                  <a:schemeClr val="bg1"/>
+                </a:solidFill>
+              </a:rPr>
               <a:t>Felhasználókezelés</a:t>
             </a:r>
+            <a:endParaRPr lang="en-US" sz="6600" dirty="0">
+              <a:solidFill>
+                <a:schemeClr val="bg1"/>
+              </a:solidFill>
+            </a:endParaRPr>
           </a:p>
         </p:txBody>
       </p:sp>
@@ -3555,8 +5158,124 @@
               <a:buNone/>
             </a:pPr>
             <a:r>
-              <a:rPr lang="en-US" sz="2400"/>
-              <a:t>A programban lehetővé tettük felhasználók regisztrációját és bejelentkezését is.</a:t>
+              <a:rPr lang="en-US" sz="2400" dirty="0">
+                <a:solidFill>
+                  <a:schemeClr val="bg1"/>
+                </a:solidFill>
+              </a:rPr>
+              <a:t>A </a:t>
+            </a:r>
+            <a:r>
+              <a:rPr lang="en-US" sz="2400" dirty="0" err="1">
+                <a:solidFill>
+                  <a:schemeClr val="bg1"/>
+                </a:solidFill>
+              </a:rPr>
+              <a:t>programban</a:t>
+            </a:r>
+            <a:r>
+              <a:rPr lang="en-US" sz="2400" dirty="0">
+                <a:solidFill>
+                  <a:schemeClr val="bg1"/>
+                </a:solidFill>
+              </a:rPr>
+              <a:t> </a:t>
+            </a:r>
+            <a:r>
+              <a:rPr lang="en-US" sz="2400" dirty="0" err="1">
+                <a:solidFill>
+                  <a:schemeClr val="bg1"/>
+                </a:solidFill>
+              </a:rPr>
+              <a:t>lehetővé</a:t>
+            </a:r>
+            <a:r>
+              <a:rPr lang="en-US" sz="2400" dirty="0">
+                <a:solidFill>
+                  <a:schemeClr val="bg1"/>
+                </a:solidFill>
+              </a:rPr>
+              <a:t> </a:t>
+            </a:r>
+            <a:r>
+              <a:rPr lang="en-US" sz="2400" dirty="0" err="1">
+                <a:solidFill>
+                  <a:schemeClr val="bg1"/>
+                </a:solidFill>
+              </a:rPr>
+              <a:t>tettük</a:t>
+            </a:r>
+            <a:r>
+              <a:rPr lang="en-US" sz="2400" dirty="0">
+                <a:solidFill>
+                  <a:schemeClr val="bg1"/>
+                </a:solidFill>
+              </a:rPr>
+              <a:t> </a:t>
+            </a:r>
+            <a:r>
+              <a:rPr lang="en-US" sz="2400" dirty="0" err="1">
+                <a:solidFill>
+                  <a:schemeClr val="bg1"/>
+                </a:solidFill>
+              </a:rPr>
+              <a:t>felhasználók</a:t>
+            </a:r>
+            <a:r>
+              <a:rPr lang="en-US" sz="2400" dirty="0">
+                <a:solidFill>
+                  <a:schemeClr val="bg1"/>
+                </a:solidFill>
+              </a:rPr>
+              <a:t> </a:t>
+            </a:r>
+            <a:r>
+              <a:rPr lang="en-US" sz="2400" dirty="0" err="1">
+                <a:solidFill>
+                  <a:schemeClr val="bg1"/>
+                </a:solidFill>
+              </a:rPr>
+              <a:t>regisztrációját</a:t>
+            </a:r>
+            <a:r>
+              <a:rPr lang="en-US" sz="2400" dirty="0">
+                <a:solidFill>
+                  <a:schemeClr val="bg1"/>
+                </a:solidFill>
+              </a:rPr>
+              <a:t> </a:t>
+            </a:r>
+            <a:r>
+              <a:rPr lang="en-US" sz="2400" dirty="0" err="1">
+                <a:solidFill>
+                  <a:schemeClr val="bg1"/>
+                </a:solidFill>
+              </a:rPr>
+              <a:t>és</a:t>
+            </a:r>
+            <a:r>
+              <a:rPr lang="en-US" sz="2400" dirty="0">
+                <a:solidFill>
+                  <a:schemeClr val="bg1"/>
+                </a:solidFill>
+              </a:rPr>
+              <a:t> </a:t>
+            </a:r>
+            <a:r>
+              <a:rPr lang="en-US" sz="2400" dirty="0" err="1">
+                <a:solidFill>
+                  <a:schemeClr val="bg1"/>
+                </a:solidFill>
+              </a:rPr>
+              <a:t>bejelentkezését</a:t>
+            </a:r>
+            <a:r>
+              <a:rPr lang="en-US" sz="2400" dirty="0">
+                <a:solidFill>
+                  <a:schemeClr val="bg1"/>
+                </a:solidFill>
+              </a:rPr>
+              <a:t> is.</a:t>
             </a:r>
           </a:p>
         </p:txBody>
@@ -3859,7 +5578,7 @@
           <p:nvPr/>
         </p:nvPicPr>
         <p:blipFill>
-          <a:blip r:embed="rId2"/>
+          <a:blip r:embed="rId3"/>
           <a:stretch>
             <a:fillRect/>
           </a:stretch>
@@ -3889,7 +5608,7 @@
           <p:nvPr/>
         </p:nvPicPr>
         <p:blipFill>
-          <a:blip r:embed="rId3"/>
+          <a:blip r:embed="rId4"/>
           <a:stretch>
             <a:fillRect/>
           </a:stretch>
@@ -3920,6 +5639,14 @@
 <file path=ppt/slides/slide3.xml><?xml version="1.0" encoding="utf-8"?>
 <p:sld xmlns:a="http://schemas.openxmlformats.org/drawingml/2006/main" xmlns:r="http://schemas.openxmlformats.org/officeDocument/2006/relationships" xmlns:p="http://schemas.openxmlformats.org/presentationml/2006/main">
   <p:cSld>
+    <p:bg>
+      <p:bgPr>
+        <a:solidFill>
+          <a:srgbClr val="1F1F1F"/>
+        </a:solidFill>
+        <a:effectLst/>
+      </p:bgPr>
+    </p:bg>
     <p:spTree>
       <p:nvGrpSpPr>
         <p:cNvPr id="1" name=""/>
@@ -3936,9 +5663,1535 @@
       </p:grpSpPr>
       <p:sp>
         <p:nvSpPr>
+          <p:cNvPr id="3" name="Tartalom helye 2">
+            <a:extLst>
+              <a:ext uri="{FF2B5EF4-FFF2-40B4-BE49-F238E27FC236}">
+                <a16:creationId xmlns:a16="http://schemas.microsoft.com/office/drawing/2014/main" id="{F2AAF065-8B1B-B7EE-BAA6-B5FEDB06B7F4}"/>
+              </a:ext>
+            </a:extLst>
+          </p:cNvPr>
+          <p:cNvSpPr>
+            <a:spLocks noGrp="1"/>
+          </p:cNvSpPr>
+          <p:nvPr>
+            <p:ph idx="1"/>
+          </p:nvPr>
+        </p:nvSpPr>
+        <p:spPr/>
+        <p:txBody>
+          <a:bodyPr/>
+          <a:lstStyle/>
+          <a:p>
+            <a:r>
+              <a:rPr lang="hu-HU">
+                <a:solidFill>
+                  <a:schemeClr val="bg1"/>
+                </a:solidFill>
+              </a:rPr>
+              <a:t>Ezt egy új fájl, a „felhasznalok.txt” segítségével.</a:t>
+            </a:r>
+          </a:p>
+          <a:p>
+            <a:r>
+              <a:rPr lang="hu-HU">
+                <a:solidFill>
+                  <a:schemeClr val="bg1"/>
+                </a:solidFill>
+              </a:rPr>
+              <a:t>A felhasználó megjelenített nevét megváltoztathatja bármikor.</a:t>
+            </a:r>
+          </a:p>
+          <a:p>
+            <a:r>
+              <a:rPr lang="hu-HU">
+                <a:solidFill>
+                  <a:schemeClr val="bg1"/>
+                </a:solidFill>
+              </a:rPr>
+              <a:t>A felhasználó jelszavát egy külső könyvtár, </a:t>
+            </a:r>
+            <a:r>
+              <a:rPr lang="hu-HU" b="1">
+                <a:solidFill>
+                  <a:schemeClr val="bg1"/>
+                </a:solidFill>
+              </a:rPr>
+              <a:t>hashlib</a:t>
+            </a:r>
+            <a:r>
+              <a:rPr lang="hu-HU">
+                <a:solidFill>
+                  <a:schemeClr val="bg1"/>
+                </a:solidFill>
+              </a:rPr>
+              <a:t> használatával titkosítjuk.</a:t>
+            </a:r>
+            <a:endParaRPr lang="hu-HU" dirty="0">
+              <a:solidFill>
+                <a:schemeClr val="bg1"/>
+              </a:solidFill>
+            </a:endParaRPr>
+          </a:p>
+        </p:txBody>
+      </p:sp>
+      <p:sp>
+        <p:nvSpPr>
+          <p:cNvPr id="4" name="Cím 1">
+            <a:extLst>
+              <a:ext uri="{FF2B5EF4-FFF2-40B4-BE49-F238E27FC236}">
+                <a16:creationId xmlns:a16="http://schemas.microsoft.com/office/drawing/2014/main" id="{3288122C-186F-6CC7-C80F-4DF6F872C12C}"/>
+              </a:ext>
+            </a:extLst>
+          </p:cNvPr>
+          <p:cNvSpPr txBox="1">
+            <a:spLocks/>
+          </p:cNvSpPr>
+          <p:nvPr/>
+        </p:nvSpPr>
+        <p:spPr>
+          <a:xfrm>
+            <a:off x="638881" y="457200"/>
+            <a:ext cx="10909640" cy="1368614"/>
+          </a:xfrm>
+          <a:prstGeom prst="rect">
+            <a:avLst/>
+          </a:prstGeom>
+        </p:spPr>
+        <p:txBody>
+          <a:bodyPr vert="horz" lIns="91440" tIns="45720" rIns="91440" bIns="45720" rtlCol="0" anchor="ctr">
+            <a:normAutofit/>
+          </a:bodyPr>
+          <a:lstStyle>
+            <a:lvl1pPr algn="l" defTabSz="914400" rtl="0" eaLnBrk="1" latinLnBrk="0" hangingPunct="1">
+              <a:lnSpc>
+                <a:spcPct val="90000"/>
+              </a:lnSpc>
+              <a:spcBef>
+                <a:spcPct val="0"/>
+              </a:spcBef>
+              <a:buNone/>
+              <a:defRPr sz="4400" kern="1200">
+                <a:solidFill>
+                  <a:schemeClr val="tx1"/>
+                </a:solidFill>
+                <a:latin typeface="+mj-lt"/>
+                <a:ea typeface="+mj-ea"/>
+                <a:cs typeface="+mj-cs"/>
+              </a:defRPr>
+            </a:lvl1pPr>
+          </a:lstStyle>
+          <a:p>
+            <a:pPr algn="ctr"/>
+            <a:r>
+              <a:rPr lang="en-US" sz="6600">
+                <a:solidFill>
+                  <a:schemeClr val="bg1"/>
+                </a:solidFill>
+              </a:rPr>
+              <a:t>Felhasználókezelés</a:t>
+            </a:r>
+            <a:endParaRPr lang="en-US" sz="6600" dirty="0">
+              <a:solidFill>
+                <a:schemeClr val="bg1"/>
+              </a:solidFill>
+            </a:endParaRPr>
+          </a:p>
+        </p:txBody>
+      </p:sp>
+      <p:pic>
+        <p:nvPicPr>
+          <p:cNvPr id="6" name="Kép 5">
+            <a:extLst>
+              <a:ext uri="{FF2B5EF4-FFF2-40B4-BE49-F238E27FC236}">
+                <a16:creationId xmlns:a16="http://schemas.microsoft.com/office/drawing/2014/main" id="{2C0751D0-5710-91C3-23CF-593EFD02F694}"/>
+              </a:ext>
+            </a:extLst>
+          </p:cNvPr>
+          <p:cNvPicPr>
+            <a:picLocks noChangeAspect="1"/>
+          </p:cNvPicPr>
+          <p:nvPr/>
+        </p:nvPicPr>
+        <p:blipFill>
+          <a:blip r:embed="rId3"/>
+          <a:stretch>
+            <a:fillRect/>
+          </a:stretch>
+        </p:blipFill>
+        <p:spPr>
+          <a:xfrm>
+            <a:off x="2292695" y="3677493"/>
+            <a:ext cx="7602011" cy="647790"/>
+          </a:xfrm>
+          <a:prstGeom prst="rect">
+            <a:avLst/>
+          </a:prstGeom>
+          <a:solidFill>
+            <a:srgbClr val="1F1F1F"/>
+          </a:solidFill>
+        </p:spPr>
+      </p:pic>
+      <p:pic>
+        <p:nvPicPr>
+          <p:cNvPr id="7" name="Kép 6" descr="A képen képernyőkép, sor, szöveg, Betűtípus látható&#10;&#10;Automatikusan generált leírás">
+            <a:extLst>
+              <a:ext uri="{FF2B5EF4-FFF2-40B4-BE49-F238E27FC236}">
+                <a16:creationId xmlns:a16="http://schemas.microsoft.com/office/drawing/2014/main" id="{B933845C-097C-311E-F8A4-9E153E307D2A}"/>
+              </a:ext>
+            </a:extLst>
+          </p:cNvPr>
+          <p:cNvPicPr>
+            <a:picLocks noChangeAspect="1"/>
+          </p:cNvPicPr>
+          <p:nvPr/>
+        </p:nvPicPr>
+        <p:blipFill>
+          <a:blip r:embed="rId4">
+            <a:extLst>
+              <a:ext uri="{28A0092B-C50C-407E-A947-70E740481C1C}">
+                <a14:useLocalDpi xmlns:a14="http://schemas.microsoft.com/office/drawing/2010/main" val="0"/>
+              </a:ext>
+            </a:extLst>
+          </a:blip>
+          <a:stretch>
+            <a:fillRect/>
+          </a:stretch>
+        </p:blipFill>
+        <p:spPr>
+          <a:xfrm>
+            <a:off x="1588906" y="4338758"/>
+            <a:ext cx="8305800" cy="2062042"/>
+          </a:xfrm>
+          <a:prstGeom prst="roundRect">
+            <a:avLst>
+              <a:gd name="adj" fmla="val 8594"/>
+            </a:avLst>
+          </a:prstGeom>
+          <a:solidFill>
+            <a:srgbClr val="FFFFFF">
+              <a:shade val="85000"/>
+            </a:srgbClr>
+          </a:solidFill>
+          <a:ln>
+            <a:noFill/>
+          </a:ln>
+          <a:effectLst>
+            <a:reflection blurRad="12700" stA="38000" endPos="28000" dist="5000" dir="5400000" sy="-100000" algn="bl" rotWithShape="0"/>
+          </a:effectLst>
+        </p:spPr>
+      </p:pic>
+    </p:spTree>
+    <p:extLst>
+      <p:ext uri="{BB962C8B-B14F-4D97-AF65-F5344CB8AC3E}">
+        <p14:creationId xmlns:p14="http://schemas.microsoft.com/office/powerpoint/2010/main" val="2490595372"/>
+      </p:ext>
+    </p:extLst>
+  </p:cSld>
+  <p:clrMapOvr>
+    <a:masterClrMapping/>
+  </p:clrMapOvr>
+</p:sld>
+</file>
+
+<file path=ppt/slides/slide4.xml><?xml version="1.0" encoding="utf-8"?>
+<p:sld xmlns:a="http://schemas.openxmlformats.org/drawingml/2006/main" xmlns:r="http://schemas.openxmlformats.org/officeDocument/2006/relationships" xmlns:p="http://schemas.openxmlformats.org/presentationml/2006/main">
+  <p:cSld>
+    <p:bg>
+      <p:bgPr>
+        <a:solidFill>
+          <a:srgbClr val="1F1F1F"/>
+        </a:solidFill>
+        <a:effectLst/>
+      </p:bgPr>
+    </p:bg>
+    <p:spTree>
+      <p:nvGrpSpPr>
+        <p:cNvPr id="1" name=""/>
+        <p:cNvGrpSpPr/>
+        <p:nvPr/>
+      </p:nvGrpSpPr>
+      <p:grpSpPr>
+        <a:xfrm>
+          <a:off x="0" y="0"/>
+          <a:ext cx="0" cy="0"/>
+          <a:chOff x="0" y="0"/>
+          <a:chExt cx="0" cy="0"/>
+        </a:xfrm>
+      </p:grpSpPr>
+      <p:sp>
+        <p:nvSpPr>
           <p:cNvPr id="2" name="Cím 1">
             <a:extLst>
               <a:ext uri="{FF2B5EF4-FFF2-40B4-BE49-F238E27FC236}">
+                <a16:creationId xmlns:a16="http://schemas.microsoft.com/office/drawing/2014/main" id="{E6CFAD8D-E407-2D5F-C22E-8B3DB542D764}"/>
+              </a:ext>
+            </a:extLst>
+          </p:cNvPr>
+          <p:cNvSpPr>
+            <a:spLocks noGrp="1"/>
+          </p:cNvSpPr>
+          <p:nvPr>
+            <p:ph type="title"/>
+          </p:nvPr>
+        </p:nvSpPr>
+        <p:spPr/>
+        <p:txBody>
+          <a:bodyPr/>
+          <a:lstStyle/>
+          <a:p>
+            <a:r>
+              <a:rPr lang="hu-HU" dirty="0">
+                <a:solidFill>
+                  <a:schemeClr val="bg1"/>
+                </a:solidFill>
+              </a:rPr>
+              <a:t>Megjelenítés (PyQt5)</a:t>
+            </a:r>
+          </a:p>
+        </p:txBody>
+      </p:sp>
+      <p:pic>
+        <p:nvPicPr>
+          <p:cNvPr id="5" name="Tartalom helye 4" descr="A képen szöveg, képernyőkép, Betűtípus, embléma látható&#10;&#10;Automatikusan generált leírás">
+            <a:extLst>
+              <a:ext uri="{FF2B5EF4-FFF2-40B4-BE49-F238E27FC236}">
+                <a16:creationId xmlns:a16="http://schemas.microsoft.com/office/drawing/2014/main" id="{7D022B77-C7E5-8FBD-C255-600E3A5671BA}"/>
+              </a:ext>
+            </a:extLst>
+          </p:cNvPr>
+          <p:cNvPicPr>
+            <a:picLocks noGrp="1" noChangeAspect="1"/>
+          </p:cNvPicPr>
+          <p:nvPr>
+            <p:ph idx="1"/>
+          </p:nvPr>
+        </p:nvPicPr>
+        <p:blipFill>
+          <a:blip r:embed="rId3">
+            <a:extLst>
+              <a:ext uri="{28A0092B-C50C-407E-A947-70E740481C1C}">
+                <a14:useLocalDpi xmlns:a14="http://schemas.microsoft.com/office/drawing/2010/main" val="0"/>
+              </a:ext>
+            </a:extLst>
+          </a:blip>
+          <a:stretch>
+            <a:fillRect/>
+          </a:stretch>
+        </p:blipFill>
+        <p:spPr>
+          <a:xfrm>
+            <a:off x="2593472" y="1626408"/>
+            <a:ext cx="7005055" cy="3677012"/>
+          </a:xfrm>
+          <a:prstGeom prst="rect">
+            <a:avLst/>
+          </a:prstGeom>
+          <a:ln>
+            <a:noFill/>
+          </a:ln>
+          <a:effectLst>
+            <a:softEdge rad="112500"/>
+          </a:effectLst>
+        </p:spPr>
+      </p:pic>
+      <p:sp>
+        <p:nvSpPr>
+          <p:cNvPr id="20" name="Szövegdoboz 19">
+            <a:extLst>
+              <a:ext uri="{FF2B5EF4-FFF2-40B4-BE49-F238E27FC236}">
+                <a16:creationId xmlns:a16="http://schemas.microsoft.com/office/drawing/2014/main" id="{C28A6CC6-B7ED-1942-EAC5-DC54C31AF13E}"/>
+              </a:ext>
+            </a:extLst>
+          </p:cNvPr>
+          <p:cNvSpPr txBox="1"/>
+          <p:nvPr/>
+        </p:nvSpPr>
+        <p:spPr>
+          <a:xfrm>
+            <a:off x="838200" y="1257076"/>
+            <a:ext cx="5828711" cy="369332"/>
+          </a:xfrm>
+          <a:prstGeom prst="rect">
+            <a:avLst/>
+          </a:prstGeom>
+          <a:noFill/>
+        </p:spPr>
+        <p:txBody>
+          <a:bodyPr wrap="square" rtlCol="0">
+            <a:spAutoFit/>
+          </a:bodyPr>
+          <a:lstStyle/>
+          <a:p>
+            <a:r>
+              <a:rPr lang="hu-HU" dirty="0">
+                <a:solidFill>
+                  <a:schemeClr val="bg1"/>
+                </a:solidFill>
+              </a:rPr>
+              <a:t>Belépés után a szerepválasztáshoz érünk el.</a:t>
+            </a:r>
+          </a:p>
+        </p:txBody>
+      </p:sp>
+    </p:spTree>
+    <p:extLst>
+      <p:ext uri="{BB962C8B-B14F-4D97-AF65-F5344CB8AC3E}">
+        <p14:creationId xmlns:p14="http://schemas.microsoft.com/office/powerpoint/2010/main" val="4165239079"/>
+      </p:ext>
+    </p:extLst>
+  </p:cSld>
+  <p:clrMapOvr>
+    <a:masterClrMapping/>
+  </p:clrMapOvr>
+</p:sld>
+</file>
+
+<file path=ppt/slides/slide5.xml><?xml version="1.0" encoding="utf-8"?>
+<p:sld xmlns:a="http://schemas.openxmlformats.org/drawingml/2006/main" xmlns:r="http://schemas.openxmlformats.org/officeDocument/2006/relationships" xmlns:p="http://schemas.openxmlformats.org/presentationml/2006/main">
+  <p:cSld>
+    <p:bg>
+      <p:bgPr>
+        <a:solidFill>
+          <a:srgbClr val="1F1F1F"/>
+        </a:solidFill>
+        <a:effectLst/>
+      </p:bgPr>
+    </p:bg>
+    <p:spTree>
+      <p:nvGrpSpPr>
+        <p:cNvPr id="1" name="">
+          <a:extLst>
+            <a:ext uri="{FF2B5EF4-FFF2-40B4-BE49-F238E27FC236}">
+              <a16:creationId xmlns:a16="http://schemas.microsoft.com/office/drawing/2014/main" id="{3C5B2B61-2104-10DF-46D8-48E3A1141781}"/>
+            </a:ext>
+          </a:extLst>
+        </p:cNvPr>
+        <p:cNvGrpSpPr/>
+        <p:nvPr/>
+      </p:nvGrpSpPr>
+      <p:grpSpPr>
+        <a:xfrm>
+          <a:off x="0" y="0"/>
+          <a:ext cx="0" cy="0"/>
+          <a:chOff x="0" y="0"/>
+          <a:chExt cx="0" cy="0"/>
+        </a:xfrm>
+      </p:grpSpPr>
+      <p:sp>
+        <p:nvSpPr>
+          <p:cNvPr id="2" name="Cím 1">
+            <a:extLst>
+              <a:ext uri="{FF2B5EF4-FFF2-40B4-BE49-F238E27FC236}">
+                <a16:creationId xmlns:a16="http://schemas.microsoft.com/office/drawing/2014/main" id="{D2F349DC-789F-771B-7EFF-3A7669634D42}"/>
+              </a:ext>
+            </a:extLst>
+          </p:cNvPr>
+          <p:cNvSpPr>
+            <a:spLocks noGrp="1"/>
+          </p:cNvSpPr>
+          <p:nvPr>
+            <p:ph type="title"/>
+          </p:nvPr>
+        </p:nvSpPr>
+        <p:spPr/>
+        <p:txBody>
+          <a:bodyPr/>
+          <a:lstStyle/>
+          <a:p>
+            <a:r>
+              <a:rPr lang="hu-HU" dirty="0">
+                <a:solidFill>
+                  <a:schemeClr val="bg1"/>
+                </a:solidFill>
+              </a:rPr>
+              <a:t>Megjelenítés</a:t>
+            </a:r>
+          </a:p>
+        </p:txBody>
+      </p:sp>
+      <p:sp>
+        <p:nvSpPr>
+          <p:cNvPr id="4" name="Tartalom helye 3">
+            <a:extLst>
+              <a:ext uri="{FF2B5EF4-FFF2-40B4-BE49-F238E27FC236}">
+                <a16:creationId xmlns:a16="http://schemas.microsoft.com/office/drawing/2014/main" id="{B0D7723E-2E10-C5D9-A30B-8CF4747BBDAC}"/>
+              </a:ext>
+            </a:extLst>
+          </p:cNvPr>
+          <p:cNvSpPr>
+            <a:spLocks noGrp="1"/>
+          </p:cNvSpPr>
+          <p:nvPr>
+            <p:ph idx="1"/>
+          </p:nvPr>
+        </p:nvSpPr>
+        <p:spPr/>
+        <p:txBody>
+          <a:bodyPr/>
+          <a:lstStyle/>
+          <a:p>
+            <a:r>
+              <a:rPr lang="hu-HU" dirty="0">
+                <a:solidFill>
+                  <a:schemeClr val="bg1"/>
+                </a:solidFill>
+              </a:rPr>
+              <a:t>A szervező képes játékok létrehozására és</a:t>
+            </a:r>
+          </a:p>
+          <a:p>
+            <a:pPr marL="0" indent="0">
+              <a:buNone/>
+            </a:pPr>
+            <a:r>
+              <a:rPr lang="hu-HU" dirty="0">
+                <a:solidFill>
+                  <a:schemeClr val="bg1"/>
+                </a:solidFill>
+              </a:rPr>
+              <a:t>lezárására is.</a:t>
+            </a:r>
+          </a:p>
+        </p:txBody>
+      </p:sp>
+      <p:sp>
+        <p:nvSpPr>
+          <p:cNvPr id="21" name="Szövegdoboz 20">
+            <a:extLst>
+              <a:ext uri="{FF2B5EF4-FFF2-40B4-BE49-F238E27FC236}">
+                <a16:creationId xmlns:a16="http://schemas.microsoft.com/office/drawing/2014/main" id="{3ED4DA59-F8A1-267D-E14A-F7129AF50155}"/>
+              </a:ext>
+            </a:extLst>
+          </p:cNvPr>
+          <p:cNvSpPr txBox="1"/>
+          <p:nvPr/>
+        </p:nvSpPr>
+        <p:spPr>
+          <a:xfrm>
+            <a:off x="838200" y="1321356"/>
+            <a:ext cx="1010854" cy="369332"/>
+          </a:xfrm>
+          <a:prstGeom prst="rect">
+            <a:avLst/>
+          </a:prstGeom>
+          <a:noFill/>
+        </p:spPr>
+        <p:txBody>
+          <a:bodyPr wrap="none" rtlCol="0">
+            <a:spAutoFit/>
+          </a:bodyPr>
+          <a:lstStyle/>
+          <a:p>
+            <a:r>
+              <a:rPr lang="hu-HU" b="1" dirty="0">
+                <a:solidFill>
+                  <a:schemeClr val="bg1"/>
+                </a:solidFill>
+              </a:rPr>
+              <a:t>Szervező</a:t>
+            </a:r>
+          </a:p>
+        </p:txBody>
+      </p:sp>
+      <p:pic>
+        <p:nvPicPr>
+          <p:cNvPr id="22" name="Kép 21" descr="A képen szöveg, elektronika, képernyőkép, képernyő látható&#10;&#10;Automatikusan generált leírás">
+            <a:extLst>
+              <a:ext uri="{FF2B5EF4-FFF2-40B4-BE49-F238E27FC236}">
+                <a16:creationId xmlns:a16="http://schemas.microsoft.com/office/drawing/2014/main" id="{E7212DDC-CC42-F271-8404-74EDDEE538BE}"/>
+              </a:ext>
+            </a:extLst>
+          </p:cNvPr>
+          <p:cNvPicPr>
+            <a:picLocks noChangeAspect="1"/>
+          </p:cNvPicPr>
+          <p:nvPr/>
+        </p:nvPicPr>
+        <p:blipFill>
+          <a:blip r:embed="rId3">
+            <a:extLst>
+              <a:ext uri="{28A0092B-C50C-407E-A947-70E740481C1C}">
+                <a14:useLocalDpi xmlns:a14="http://schemas.microsoft.com/office/drawing/2010/main" val="0"/>
+              </a:ext>
+            </a:extLst>
+          </a:blip>
+          <a:stretch>
+            <a:fillRect/>
+          </a:stretch>
+        </p:blipFill>
+        <p:spPr>
+          <a:xfrm>
+            <a:off x="1155032" y="2819292"/>
+            <a:ext cx="4805481" cy="3635388"/>
+          </a:xfrm>
+          <a:prstGeom prst="rect">
+            <a:avLst/>
+          </a:prstGeom>
+          <a:ln>
+            <a:noFill/>
+          </a:ln>
+          <a:effectLst>
+            <a:outerShdw blurRad="190500" algn="tl" rotWithShape="0">
+              <a:srgbClr val="000000">
+                <a:alpha val="70000"/>
+              </a:srgbClr>
+            </a:outerShdw>
+          </a:effectLst>
+        </p:spPr>
+      </p:pic>
+      <p:pic>
+        <p:nvPicPr>
+          <p:cNvPr id="23" name="Kép 22" descr="A képen képernyőkép, szöveg, sor, Párhuzamos látható&#10;&#10;Automatikusan generált leírás">
+            <a:extLst>
+              <a:ext uri="{FF2B5EF4-FFF2-40B4-BE49-F238E27FC236}">
+                <a16:creationId xmlns:a16="http://schemas.microsoft.com/office/drawing/2014/main" id="{2229C04F-EFEF-97A9-561A-EB8C314C15FD}"/>
+              </a:ext>
+            </a:extLst>
+          </p:cNvPr>
+          <p:cNvPicPr>
+            <a:picLocks noChangeAspect="1"/>
+          </p:cNvPicPr>
+          <p:nvPr/>
+        </p:nvPicPr>
+        <p:blipFill>
+          <a:blip r:embed="rId4">
+            <a:extLst>
+              <a:ext uri="{28A0092B-C50C-407E-A947-70E740481C1C}">
+                <a14:useLocalDpi xmlns:a14="http://schemas.microsoft.com/office/drawing/2010/main" val="0"/>
+              </a:ext>
+            </a:extLst>
+          </a:blip>
+          <a:stretch>
+            <a:fillRect/>
+          </a:stretch>
+        </p:blipFill>
+        <p:spPr>
+          <a:xfrm>
+            <a:off x="7233407" y="681037"/>
+            <a:ext cx="4732134" cy="3621456"/>
+          </a:xfrm>
+          <a:prstGeom prst="rect">
+            <a:avLst/>
+          </a:prstGeom>
+          <a:ln>
+            <a:noFill/>
+          </a:ln>
+          <a:effectLst>
+            <a:outerShdw blurRad="190500" algn="tl" rotWithShape="0">
+              <a:srgbClr val="000000">
+                <a:alpha val="70000"/>
+              </a:srgbClr>
+            </a:outerShdw>
+          </a:effectLst>
+        </p:spPr>
+      </p:pic>
+      <p:pic>
+        <p:nvPicPr>
+          <p:cNvPr id="24" name="Kép 23" descr="A képen szöveg, képernyőkép, Betűtípus látható&#10;&#10;Automatikusan generált leírás">
+            <a:extLst>
+              <a:ext uri="{FF2B5EF4-FFF2-40B4-BE49-F238E27FC236}">
+                <a16:creationId xmlns:a16="http://schemas.microsoft.com/office/drawing/2014/main" id="{62B1F31A-2ADD-8F42-319D-A8DC98518906}"/>
+              </a:ext>
+            </a:extLst>
+          </p:cNvPr>
+          <p:cNvPicPr>
+            <a:picLocks noChangeAspect="1"/>
+          </p:cNvPicPr>
+          <p:nvPr/>
+        </p:nvPicPr>
+        <p:blipFill>
+          <a:blip r:embed="rId5">
+            <a:extLst>
+              <a:ext uri="{28A0092B-C50C-407E-A947-70E740481C1C}">
+                <a14:useLocalDpi xmlns:a14="http://schemas.microsoft.com/office/drawing/2010/main" val="0"/>
+              </a:ext>
+            </a:extLst>
+          </a:blip>
+          <a:stretch>
+            <a:fillRect/>
+          </a:stretch>
+        </p:blipFill>
+        <p:spPr>
+          <a:xfrm>
+            <a:off x="6622181" y="4909052"/>
+            <a:ext cx="5343360" cy="1882273"/>
+          </a:xfrm>
+          <a:prstGeom prst="rect">
+            <a:avLst/>
+          </a:prstGeom>
+          <a:ln>
+            <a:noFill/>
+          </a:ln>
+          <a:effectLst>
+            <a:outerShdw blurRad="190500" algn="tl" rotWithShape="0">
+              <a:srgbClr val="000000">
+                <a:alpha val="70000"/>
+              </a:srgbClr>
+            </a:outerShdw>
+          </a:effectLst>
+        </p:spPr>
+      </p:pic>
+    </p:spTree>
+    <p:extLst>
+      <p:ext uri="{BB962C8B-B14F-4D97-AF65-F5344CB8AC3E}">
+        <p14:creationId xmlns:p14="http://schemas.microsoft.com/office/powerpoint/2010/main" val="4269932760"/>
+      </p:ext>
+    </p:extLst>
+  </p:cSld>
+  <p:clrMapOvr>
+    <a:masterClrMapping/>
+  </p:clrMapOvr>
+</p:sld>
+</file>
+
+<file path=ppt/slides/slide6.xml><?xml version="1.0" encoding="utf-8"?>
+<p:sld xmlns:a="http://schemas.openxmlformats.org/drawingml/2006/main" xmlns:r="http://schemas.openxmlformats.org/officeDocument/2006/relationships" xmlns:p="http://schemas.openxmlformats.org/presentationml/2006/main">
+  <p:cSld>
+    <p:bg>
+      <p:bgPr>
+        <a:solidFill>
+          <a:srgbClr val="1F1F1F"/>
+        </a:solidFill>
+        <a:effectLst/>
+      </p:bgPr>
+    </p:bg>
+    <p:spTree>
+      <p:nvGrpSpPr>
+        <p:cNvPr id="1" name="">
+          <a:extLst>
+            <a:ext uri="{FF2B5EF4-FFF2-40B4-BE49-F238E27FC236}">
+              <a16:creationId xmlns:a16="http://schemas.microsoft.com/office/drawing/2014/main" id="{E5680CFF-3E0D-11D0-5731-39AD4D5CC989}"/>
+            </a:ext>
+          </a:extLst>
+        </p:cNvPr>
+        <p:cNvGrpSpPr/>
+        <p:nvPr/>
+      </p:nvGrpSpPr>
+      <p:grpSpPr>
+        <a:xfrm>
+          <a:off x="0" y="0"/>
+          <a:ext cx="0" cy="0"/>
+          <a:chOff x="0" y="0"/>
+          <a:chExt cx="0" cy="0"/>
+        </a:xfrm>
+      </p:grpSpPr>
+      <p:sp>
+        <p:nvSpPr>
+          <p:cNvPr id="2" name="Cím 1">
+            <a:extLst>
+              <a:ext uri="{FF2B5EF4-FFF2-40B4-BE49-F238E27FC236}">
+                <a16:creationId xmlns:a16="http://schemas.microsoft.com/office/drawing/2014/main" id="{82BC5CFE-09F9-F8BC-4317-1666BA8C31D1}"/>
+              </a:ext>
+            </a:extLst>
+          </p:cNvPr>
+          <p:cNvSpPr>
+            <a:spLocks noGrp="1"/>
+          </p:cNvSpPr>
+          <p:nvPr>
+            <p:ph type="title"/>
+          </p:nvPr>
+        </p:nvSpPr>
+        <p:spPr/>
+        <p:txBody>
+          <a:bodyPr/>
+          <a:lstStyle/>
+          <a:p>
+            <a:r>
+              <a:rPr lang="hu-HU" dirty="0">
+                <a:solidFill>
+                  <a:schemeClr val="bg1"/>
+                </a:solidFill>
+              </a:rPr>
+              <a:t>Megjelenítés</a:t>
+            </a:r>
+          </a:p>
+        </p:txBody>
+      </p:sp>
+      <p:sp>
+        <p:nvSpPr>
+          <p:cNvPr id="4" name="Tartalom helye 3">
+            <a:extLst>
+              <a:ext uri="{FF2B5EF4-FFF2-40B4-BE49-F238E27FC236}">
+                <a16:creationId xmlns:a16="http://schemas.microsoft.com/office/drawing/2014/main" id="{0D8303B8-7304-F046-D065-BC3AAF4522D4}"/>
+              </a:ext>
+            </a:extLst>
+          </p:cNvPr>
+          <p:cNvSpPr>
+            <a:spLocks noGrp="1"/>
+          </p:cNvSpPr>
+          <p:nvPr>
+            <p:ph idx="1"/>
+          </p:nvPr>
+        </p:nvSpPr>
+        <p:spPr/>
+        <p:txBody>
+          <a:bodyPr/>
+          <a:lstStyle/>
+          <a:p>
+            <a:r>
+              <a:rPr lang="hu-HU" dirty="0">
+                <a:solidFill>
+                  <a:schemeClr val="bg1"/>
+                </a:solidFill>
+              </a:rPr>
+              <a:t>A fogadó képes le nem zárt játékokra való fogadásra.</a:t>
+            </a:r>
+          </a:p>
+        </p:txBody>
+      </p:sp>
+      <p:sp>
+        <p:nvSpPr>
+          <p:cNvPr id="21" name="Szövegdoboz 20">
+            <a:extLst>
+              <a:ext uri="{FF2B5EF4-FFF2-40B4-BE49-F238E27FC236}">
+                <a16:creationId xmlns:a16="http://schemas.microsoft.com/office/drawing/2014/main" id="{53640BE9-163B-9169-F6D0-103533CC7F2A}"/>
+              </a:ext>
+            </a:extLst>
+          </p:cNvPr>
+          <p:cNvSpPr txBox="1"/>
+          <p:nvPr/>
+        </p:nvSpPr>
+        <p:spPr>
+          <a:xfrm>
+            <a:off x="838200" y="1321356"/>
+            <a:ext cx="876778" cy="369332"/>
+          </a:xfrm>
+          <a:prstGeom prst="rect">
+            <a:avLst/>
+          </a:prstGeom>
+          <a:noFill/>
+        </p:spPr>
+        <p:txBody>
+          <a:bodyPr wrap="none" rtlCol="0">
+            <a:spAutoFit/>
+          </a:bodyPr>
+          <a:lstStyle/>
+          <a:p>
+            <a:r>
+              <a:rPr lang="hu-HU" b="1" dirty="0">
+                <a:solidFill>
+                  <a:schemeClr val="bg1"/>
+                </a:solidFill>
+              </a:rPr>
+              <a:t>Fogadó</a:t>
+            </a:r>
+          </a:p>
+        </p:txBody>
+      </p:sp>
+      <p:pic>
+        <p:nvPicPr>
+          <p:cNvPr id="26" name="Kép 25" descr="A képen szöveg, képernyőkép, Betűtípus, szám látható&#10;&#10;Automatikusan generált leírás">
+            <a:extLst>
+              <a:ext uri="{FF2B5EF4-FFF2-40B4-BE49-F238E27FC236}">
+                <a16:creationId xmlns:a16="http://schemas.microsoft.com/office/drawing/2014/main" id="{1B28A2DA-3647-EF65-5684-1E858725F35C}"/>
+              </a:ext>
+            </a:extLst>
+          </p:cNvPr>
+          <p:cNvPicPr>
+            <a:picLocks noChangeAspect="1"/>
+          </p:cNvPicPr>
+          <p:nvPr/>
+        </p:nvPicPr>
+        <p:blipFill>
+          <a:blip r:embed="rId3">
+            <a:extLst>
+              <a:ext uri="{28A0092B-C50C-407E-A947-70E740481C1C}">
+                <a14:useLocalDpi xmlns:a14="http://schemas.microsoft.com/office/drawing/2010/main" val="0"/>
+              </a:ext>
+            </a:extLst>
+          </a:blip>
+          <a:stretch>
+            <a:fillRect/>
+          </a:stretch>
+        </p:blipFill>
+        <p:spPr>
+          <a:xfrm>
+            <a:off x="6988270" y="2442071"/>
+            <a:ext cx="4811665" cy="2967254"/>
+          </a:xfrm>
+          <a:prstGeom prst="rect">
+            <a:avLst/>
+          </a:prstGeom>
+          <a:ln>
+            <a:noFill/>
+          </a:ln>
+          <a:effectLst>
+            <a:outerShdw blurRad="190500" algn="tl" rotWithShape="0">
+              <a:srgbClr val="000000">
+                <a:alpha val="70000"/>
+              </a:srgbClr>
+            </a:outerShdw>
+          </a:effectLst>
+        </p:spPr>
+      </p:pic>
+      <p:pic>
+        <p:nvPicPr>
+          <p:cNvPr id="27" name="Kép 26" descr="A képen szöveg, képernyőkép, multimédia, számítógép látható&#10;&#10;Automatikusan generált leírás">
+            <a:extLst>
+              <a:ext uri="{FF2B5EF4-FFF2-40B4-BE49-F238E27FC236}">
+                <a16:creationId xmlns:a16="http://schemas.microsoft.com/office/drawing/2014/main" id="{197AB6A7-103F-80EB-CAE2-1DD175532F91}"/>
+              </a:ext>
+            </a:extLst>
+          </p:cNvPr>
+          <p:cNvPicPr>
+            <a:picLocks noChangeAspect="1"/>
+          </p:cNvPicPr>
+          <p:nvPr/>
+        </p:nvPicPr>
+        <p:blipFill>
+          <a:blip r:embed="rId4">
+            <a:extLst>
+              <a:ext uri="{28A0092B-C50C-407E-A947-70E740481C1C}">
+                <a14:useLocalDpi xmlns:a14="http://schemas.microsoft.com/office/drawing/2010/main" val="0"/>
+              </a:ext>
+            </a:extLst>
+          </a:blip>
+          <a:stretch>
+            <a:fillRect/>
+          </a:stretch>
+        </p:blipFill>
+        <p:spPr>
+          <a:xfrm>
+            <a:off x="838200" y="2800721"/>
+            <a:ext cx="4811664" cy="3692154"/>
+          </a:xfrm>
+          <a:prstGeom prst="rect">
+            <a:avLst/>
+          </a:prstGeom>
+          <a:ln>
+            <a:noFill/>
+          </a:ln>
+          <a:effectLst>
+            <a:outerShdw blurRad="190500" algn="tl" rotWithShape="0">
+              <a:srgbClr val="000000">
+                <a:alpha val="70000"/>
+              </a:srgbClr>
+            </a:outerShdw>
+          </a:effectLst>
+        </p:spPr>
+      </p:pic>
+    </p:spTree>
+    <p:extLst>
+      <p:ext uri="{BB962C8B-B14F-4D97-AF65-F5344CB8AC3E}">
+        <p14:creationId xmlns:p14="http://schemas.microsoft.com/office/powerpoint/2010/main" val="1084522426"/>
+      </p:ext>
+    </p:extLst>
+  </p:cSld>
+  <p:clrMapOvr>
+    <a:masterClrMapping/>
+  </p:clrMapOvr>
+</p:sld>
+</file>
+
+<file path=ppt/slides/slide7.xml><?xml version="1.0" encoding="utf-8"?>
+<p:sld xmlns:a="http://schemas.openxmlformats.org/drawingml/2006/main" xmlns:r="http://schemas.openxmlformats.org/officeDocument/2006/relationships" xmlns:p="http://schemas.openxmlformats.org/presentationml/2006/main">
+  <p:cSld>
+    <p:bg>
+      <p:bgPr>
+        <a:solidFill>
+          <a:srgbClr val="1F1F1F"/>
+        </a:solidFill>
+        <a:effectLst/>
+      </p:bgPr>
+    </p:bg>
+    <p:spTree>
+      <p:nvGrpSpPr>
+        <p:cNvPr id="1" name=""/>
+        <p:cNvGrpSpPr/>
+        <p:nvPr/>
+      </p:nvGrpSpPr>
+      <p:grpSpPr>
+        <a:xfrm>
+          <a:off x="0" y="0"/>
+          <a:ext cx="0" cy="0"/>
+          <a:chOff x="0" y="0"/>
+          <a:chExt cx="0" cy="0"/>
+        </a:xfrm>
+      </p:grpSpPr>
+      <p:sp>
+        <p:nvSpPr>
+          <p:cNvPr id="2" name="Cím 1">
+            <a:extLst>
+              <a:ext uri="{FF2B5EF4-FFF2-40B4-BE49-F238E27FC236}">
+                <a16:creationId xmlns:a16="http://schemas.microsoft.com/office/drawing/2014/main" id="{FB6DEC57-F2D9-61DF-95A9-88CEA74BA062}"/>
+              </a:ext>
+            </a:extLst>
+          </p:cNvPr>
+          <p:cNvSpPr>
+            <a:spLocks noGrp="1"/>
+          </p:cNvSpPr>
+          <p:nvPr>
+            <p:ph type="title"/>
+          </p:nvPr>
+        </p:nvSpPr>
+        <p:spPr/>
+        <p:txBody>
+          <a:bodyPr/>
+          <a:lstStyle/>
+          <a:p>
+            <a:r>
+              <a:rPr lang="hu-HU" dirty="0">
+                <a:solidFill>
+                  <a:schemeClr val="bg1"/>
+                </a:solidFill>
+              </a:rPr>
+              <a:t>Hogyan készült</a:t>
+            </a:r>
+          </a:p>
+        </p:txBody>
+      </p:sp>
+      <p:sp>
+        <p:nvSpPr>
+          <p:cNvPr id="3" name="Tartalom helye 2">
+            <a:extLst>
+              <a:ext uri="{FF2B5EF4-FFF2-40B4-BE49-F238E27FC236}">
+                <a16:creationId xmlns:a16="http://schemas.microsoft.com/office/drawing/2014/main" id="{09DEBA57-99AA-5D9A-48CB-F7929DB268F6}"/>
+              </a:ext>
+            </a:extLst>
+          </p:cNvPr>
+          <p:cNvSpPr>
+            <a:spLocks noGrp="1"/>
+          </p:cNvSpPr>
+          <p:nvPr>
+            <p:ph idx="1"/>
+          </p:nvPr>
+        </p:nvSpPr>
+        <p:spPr/>
+        <p:txBody>
+          <a:bodyPr/>
+          <a:lstStyle/>
+          <a:p>
+            <a:r>
+              <a:rPr lang="hu-HU" dirty="0">
+                <a:solidFill>
+                  <a:schemeClr val="bg1"/>
+                </a:solidFill>
+              </a:rPr>
+              <a:t>Különböző csoportos projekt haladási eszközökkel. (</a:t>
+            </a:r>
+            <a:r>
+              <a:rPr lang="hu-HU" dirty="0" err="1">
+                <a:solidFill>
+                  <a:schemeClr val="bg1"/>
+                </a:solidFill>
+              </a:rPr>
+              <a:t>pl</a:t>
+            </a:r>
+            <a:r>
+              <a:rPr lang="hu-HU" dirty="0">
+                <a:solidFill>
+                  <a:schemeClr val="bg1"/>
+                </a:solidFill>
+              </a:rPr>
+              <a:t>: </a:t>
+            </a:r>
+            <a:r>
+              <a:rPr lang="hu-HU" dirty="0" err="1">
+                <a:solidFill>
+                  <a:schemeClr val="bg1"/>
+                </a:solidFill>
+              </a:rPr>
+              <a:t>Github</a:t>
+            </a:r>
+            <a:r>
+              <a:rPr lang="hu-HU" dirty="0">
+                <a:solidFill>
+                  <a:schemeClr val="bg1"/>
+                </a:solidFill>
+              </a:rPr>
+              <a:t>, </a:t>
+            </a:r>
+            <a:r>
+              <a:rPr lang="hu-HU" dirty="0" err="1">
+                <a:solidFill>
+                  <a:schemeClr val="bg1"/>
+                </a:solidFill>
+              </a:rPr>
+              <a:t>Figma</a:t>
+            </a:r>
+            <a:r>
+              <a:rPr lang="hu-HU" dirty="0">
+                <a:solidFill>
+                  <a:schemeClr val="bg1"/>
+                </a:solidFill>
+              </a:rPr>
+              <a:t>, </a:t>
+            </a:r>
+            <a:r>
+              <a:rPr lang="hu-HU" dirty="0" err="1">
+                <a:solidFill>
+                  <a:schemeClr val="bg1"/>
+                </a:solidFill>
+              </a:rPr>
+              <a:t>Trello</a:t>
+            </a:r>
+            <a:r>
+              <a:rPr lang="hu-HU" dirty="0">
+                <a:solidFill>
+                  <a:schemeClr val="bg1"/>
+                </a:solidFill>
+              </a:rPr>
+              <a:t>)</a:t>
+            </a:r>
+          </a:p>
+        </p:txBody>
+      </p:sp>
+      <p:pic>
+        <p:nvPicPr>
+          <p:cNvPr id="19" name="Kép 18">
+            <a:extLst>
+              <a:ext uri="{FF2B5EF4-FFF2-40B4-BE49-F238E27FC236}">
+                <a16:creationId xmlns:a16="http://schemas.microsoft.com/office/drawing/2014/main" id="{757D3D39-78C9-0434-AF35-542014B7F631}"/>
+              </a:ext>
+              <a:ext uri="{C183D7F6-B498-43B3-948B-1728B52AA6E4}">
+                <adec:decorative xmlns:adec="http://schemas.microsoft.com/office/drawing/2017/decorative" val="0"/>
+              </a:ext>
+            </a:extLst>
+          </p:cNvPr>
+          <p:cNvPicPr>
+            <a:picLocks noChangeAspect="1"/>
+          </p:cNvPicPr>
+          <p:nvPr/>
+        </p:nvPicPr>
+        <p:blipFill>
+          <a:blip r:embed="rId3"/>
+          <a:stretch>
+            <a:fillRect/>
+          </a:stretch>
+        </p:blipFill>
+        <p:spPr>
+          <a:xfrm>
+            <a:off x="8027469" y="3943452"/>
+            <a:ext cx="4109552" cy="2612429"/>
+          </a:xfrm>
+          <a:prstGeom prst="roundRect">
+            <a:avLst>
+              <a:gd name="adj" fmla="val 8594"/>
+            </a:avLst>
+          </a:prstGeom>
+          <a:solidFill>
+            <a:srgbClr val="FFFFFF">
+              <a:shade val="85000"/>
+            </a:srgbClr>
+          </a:solidFill>
+          <a:ln>
+            <a:noFill/>
+          </a:ln>
+          <a:effectLst>
+            <a:reflection blurRad="12700" stA="38000" endPos="28000" dist="5000" dir="5400000" sy="-100000" algn="bl" rotWithShape="0"/>
+          </a:effectLst>
+        </p:spPr>
+      </p:pic>
+      <p:sp>
+        <p:nvSpPr>
+          <p:cNvPr id="4" name="Szövegdoboz 3">
+            <a:extLst>
+              <a:ext uri="{FF2B5EF4-FFF2-40B4-BE49-F238E27FC236}">
+                <a16:creationId xmlns:a16="http://schemas.microsoft.com/office/drawing/2014/main" id="{C7214A79-CA7E-B752-BB23-64761FD06C90}"/>
+              </a:ext>
+            </a:extLst>
+          </p:cNvPr>
+          <p:cNvSpPr txBox="1"/>
+          <p:nvPr/>
+        </p:nvSpPr>
+        <p:spPr>
+          <a:xfrm>
+            <a:off x="8104472" y="6123543"/>
+            <a:ext cx="756938" cy="369332"/>
+          </a:xfrm>
+          <a:prstGeom prst="rect">
+            <a:avLst/>
+          </a:prstGeom>
+          <a:noFill/>
+        </p:spPr>
+        <p:txBody>
+          <a:bodyPr wrap="none" rtlCol="0">
+            <a:spAutoFit/>
+          </a:bodyPr>
+          <a:lstStyle/>
+          <a:p>
+            <a:r>
+              <a:rPr lang="hu-HU" b="1" dirty="0" err="1">
+                <a:solidFill>
+                  <a:schemeClr val="bg1"/>
+                </a:solidFill>
+              </a:rPr>
+              <a:t>Figma</a:t>
+            </a:r>
+            <a:endParaRPr lang="hu-HU" b="1" dirty="0">
+              <a:solidFill>
+                <a:schemeClr val="bg1"/>
+              </a:solidFill>
+            </a:endParaRPr>
+          </a:p>
+        </p:txBody>
+      </p:sp>
+      <p:pic>
+        <p:nvPicPr>
+          <p:cNvPr id="6" name="Kép 5">
+            <a:extLst>
+              <a:ext uri="{FF2B5EF4-FFF2-40B4-BE49-F238E27FC236}">
+                <a16:creationId xmlns:a16="http://schemas.microsoft.com/office/drawing/2014/main" id="{F5300ACD-F437-E699-BD68-8DAFDE64056F}"/>
+              </a:ext>
+            </a:extLst>
+          </p:cNvPr>
+          <p:cNvPicPr>
+            <a:picLocks noChangeAspect="1"/>
+          </p:cNvPicPr>
+          <p:nvPr/>
+        </p:nvPicPr>
+        <p:blipFill>
+          <a:blip r:embed="rId4"/>
+          <a:stretch>
+            <a:fillRect/>
+          </a:stretch>
+        </p:blipFill>
+        <p:spPr>
+          <a:xfrm>
+            <a:off x="3701564" y="3829181"/>
+            <a:ext cx="3710738" cy="2840970"/>
+          </a:xfrm>
+          <a:prstGeom prst="roundRect">
+            <a:avLst>
+              <a:gd name="adj" fmla="val 8594"/>
+            </a:avLst>
+          </a:prstGeom>
+          <a:solidFill>
+            <a:srgbClr val="FFFFFF">
+              <a:shade val="85000"/>
+            </a:srgbClr>
+          </a:solidFill>
+          <a:ln>
+            <a:noFill/>
+          </a:ln>
+          <a:effectLst>
+            <a:reflection blurRad="12700" stA="38000" endPos="28000" dist="5000" dir="5400000" sy="-100000" algn="bl" rotWithShape="0"/>
+          </a:effectLst>
+        </p:spPr>
+      </p:pic>
+      <p:sp>
+        <p:nvSpPr>
+          <p:cNvPr id="7" name="Szövegdoboz 6">
+            <a:extLst>
+              <a:ext uri="{FF2B5EF4-FFF2-40B4-BE49-F238E27FC236}">
+                <a16:creationId xmlns:a16="http://schemas.microsoft.com/office/drawing/2014/main" id="{18FB9314-32E3-7B22-B835-19D48B71E7D4}"/>
+              </a:ext>
+            </a:extLst>
+          </p:cNvPr>
+          <p:cNvSpPr txBox="1"/>
+          <p:nvPr/>
+        </p:nvSpPr>
+        <p:spPr>
+          <a:xfrm>
+            <a:off x="3811604" y="6227938"/>
+            <a:ext cx="838691" cy="369332"/>
+          </a:xfrm>
+          <a:prstGeom prst="rect">
+            <a:avLst/>
+          </a:prstGeom>
+          <a:noFill/>
+        </p:spPr>
+        <p:txBody>
+          <a:bodyPr wrap="none" rtlCol="0">
+            <a:spAutoFit/>
+          </a:bodyPr>
+          <a:lstStyle/>
+          <a:p>
+            <a:r>
+              <a:rPr lang="hu-HU" b="1" dirty="0" err="1">
+                <a:solidFill>
+                  <a:schemeClr val="bg1"/>
+                </a:solidFill>
+              </a:rPr>
+              <a:t>Github</a:t>
+            </a:r>
+            <a:endParaRPr lang="hu-HU" b="1" dirty="0">
+              <a:solidFill>
+                <a:schemeClr val="bg1"/>
+              </a:solidFill>
+            </a:endParaRPr>
+          </a:p>
+        </p:txBody>
+      </p:sp>
+      <p:pic>
+        <p:nvPicPr>
+          <p:cNvPr id="9" name="Kép 8">
+            <a:extLst>
+              <a:ext uri="{FF2B5EF4-FFF2-40B4-BE49-F238E27FC236}">
+                <a16:creationId xmlns:a16="http://schemas.microsoft.com/office/drawing/2014/main" id="{B5C1EBC8-F2B2-FBCC-958C-C63542F8FE5A}"/>
+              </a:ext>
+            </a:extLst>
+          </p:cNvPr>
+          <p:cNvPicPr>
+            <a:picLocks noChangeAspect="1"/>
+          </p:cNvPicPr>
+          <p:nvPr/>
+        </p:nvPicPr>
+        <p:blipFill>
+          <a:blip r:embed="rId5"/>
+          <a:stretch>
+            <a:fillRect/>
+          </a:stretch>
+        </p:blipFill>
+        <p:spPr>
+          <a:xfrm>
+            <a:off x="445249" y="3943452"/>
+            <a:ext cx="3050348" cy="1888311"/>
+          </a:xfrm>
+          <a:prstGeom prst="roundRect">
+            <a:avLst>
+              <a:gd name="adj" fmla="val 8594"/>
+            </a:avLst>
+          </a:prstGeom>
+          <a:solidFill>
+            <a:srgbClr val="FFFFFF">
+              <a:shade val="85000"/>
+            </a:srgbClr>
+          </a:solidFill>
+          <a:ln>
+            <a:noFill/>
+          </a:ln>
+          <a:effectLst>
+            <a:reflection blurRad="12700" stA="38000" endPos="28000" dist="5000" dir="5400000" sy="-100000" algn="bl" rotWithShape="0"/>
+          </a:effectLst>
+        </p:spPr>
+      </p:pic>
+      <p:sp>
+        <p:nvSpPr>
+          <p:cNvPr id="10" name="Szövegdoboz 9">
+            <a:extLst>
+              <a:ext uri="{FF2B5EF4-FFF2-40B4-BE49-F238E27FC236}">
+                <a16:creationId xmlns:a16="http://schemas.microsoft.com/office/drawing/2014/main" id="{6FDD96F3-8E78-2287-A88C-0C021D2B1DB7}"/>
+              </a:ext>
+            </a:extLst>
+          </p:cNvPr>
+          <p:cNvSpPr txBox="1"/>
+          <p:nvPr/>
+        </p:nvSpPr>
+        <p:spPr>
+          <a:xfrm>
+            <a:off x="426265" y="5486400"/>
+            <a:ext cx="716863" cy="369332"/>
+          </a:xfrm>
+          <a:prstGeom prst="rect">
+            <a:avLst/>
+          </a:prstGeom>
+          <a:noFill/>
+        </p:spPr>
+        <p:txBody>
+          <a:bodyPr wrap="none" rtlCol="0">
+            <a:spAutoFit/>
+          </a:bodyPr>
+          <a:lstStyle/>
+          <a:p>
+            <a:r>
+              <a:rPr lang="hu-HU" b="1" dirty="0" err="1">
+                <a:solidFill>
+                  <a:schemeClr val="bg1"/>
+                </a:solidFill>
+              </a:rPr>
+              <a:t>Trello</a:t>
+            </a:r>
+            <a:endParaRPr lang="hu-HU" b="1" dirty="0">
+              <a:solidFill>
+                <a:schemeClr val="bg1"/>
+              </a:solidFill>
+            </a:endParaRPr>
+          </a:p>
+        </p:txBody>
+      </p:sp>
+    </p:spTree>
+    <p:extLst>
+      <p:ext uri="{BB962C8B-B14F-4D97-AF65-F5344CB8AC3E}">
+        <p14:creationId xmlns:p14="http://schemas.microsoft.com/office/powerpoint/2010/main" val="3028513148"/>
+      </p:ext>
+    </p:extLst>
+  </p:cSld>
+  <p:clrMapOvr>
+    <a:masterClrMapping/>
+  </p:clrMapOvr>
+</p:sld>
+</file>
+
+<file path=ppt/slides/slide8.xml><?xml version="1.0" encoding="utf-8"?>
+<p:sld xmlns:a="http://schemas.openxmlformats.org/drawingml/2006/main" xmlns:r="http://schemas.openxmlformats.org/officeDocument/2006/relationships" xmlns:p="http://schemas.openxmlformats.org/presentationml/2006/main">
+  <p:cSld>
+    <p:bg>
+      <p:bgPr>
+        <a:solidFill>
+          <a:srgbClr val="1F1F1F"/>
+        </a:solidFill>
+        <a:effectLst/>
+      </p:bgPr>
+    </p:bg>
+    <p:spTree>
+      <p:nvGrpSpPr>
+        <p:cNvPr id="1" name="">
+          <a:extLst>
+            <a:ext uri="{FF2B5EF4-FFF2-40B4-BE49-F238E27FC236}">
+              <a16:creationId xmlns:a16="http://schemas.microsoft.com/office/drawing/2014/main" id="{3D956EA0-31B3-9A75-C8D1-D182E2A7AF92}"/>
+            </a:ext>
+          </a:extLst>
+        </p:cNvPr>
+        <p:cNvGrpSpPr/>
+        <p:nvPr/>
+      </p:nvGrpSpPr>
+      <p:grpSpPr>
+        <a:xfrm>
+          <a:off x="0" y="0"/>
+          <a:ext cx="0" cy="0"/>
+          <a:chOff x="0" y="0"/>
+          <a:chExt cx="0" cy="0"/>
+        </a:xfrm>
+      </p:grpSpPr>
+      <p:sp>
+        <p:nvSpPr>
+          <p:cNvPr id="2" name="Cím 1">
+            <a:extLst>
+              <a:ext uri="{FF2B5EF4-FFF2-40B4-BE49-F238E27FC236}">
+                <a16:creationId xmlns:a16="http://schemas.microsoft.com/office/drawing/2014/main" id="{89CA1D35-1E1F-38BB-4111-622F9893D1EF}"/>
+              </a:ext>
+            </a:extLst>
+          </p:cNvPr>
+          <p:cNvSpPr>
+            <a:spLocks noGrp="1"/>
+          </p:cNvSpPr>
+          <p:nvPr>
+            <p:ph type="title"/>
+          </p:nvPr>
+        </p:nvSpPr>
+        <p:spPr/>
+        <p:txBody>
+          <a:bodyPr/>
+          <a:lstStyle/>
+          <a:p>
+            <a:r>
+              <a:rPr lang="hu-HU" dirty="0">
+                <a:solidFill>
+                  <a:schemeClr val="bg1"/>
+                </a:solidFill>
+              </a:rPr>
+              <a:t>Hogyan készült</a:t>
+            </a:r>
+          </a:p>
+        </p:txBody>
+      </p:sp>
+      <p:sp>
+        <p:nvSpPr>
+          <p:cNvPr id="3" name="Tartalom helye 2">
+            <a:extLst>
+              <a:ext uri="{FF2B5EF4-FFF2-40B4-BE49-F238E27FC236}">
+                <a16:creationId xmlns:a16="http://schemas.microsoft.com/office/drawing/2014/main" id="{367EC459-411C-843C-6ACF-874C80B09B37}"/>
+              </a:ext>
+            </a:extLst>
+          </p:cNvPr>
+          <p:cNvSpPr>
+            <a:spLocks noGrp="1"/>
+          </p:cNvSpPr>
+          <p:nvPr>
+            <p:ph idx="1"/>
+          </p:nvPr>
+        </p:nvSpPr>
+        <p:spPr/>
+        <p:txBody>
+          <a:bodyPr/>
+          <a:lstStyle/>
+          <a:p>
+            <a:pPr marL="0" indent="0">
+              <a:buNone/>
+            </a:pPr>
+            <a:r>
+              <a:rPr lang="hu-HU" dirty="0">
+                <a:solidFill>
+                  <a:schemeClr val="bg1"/>
+                </a:solidFill>
+              </a:rPr>
+              <a:t>Feladatmegosztás.</a:t>
+            </a:r>
+          </a:p>
+          <a:p>
+            <a:r>
+              <a:rPr lang="hu-HU" dirty="0">
+                <a:solidFill>
+                  <a:schemeClr val="bg1"/>
+                </a:solidFill>
+              </a:rPr>
+              <a:t>Attila főként a kód megírásában,</a:t>
+            </a:r>
+          </a:p>
+          <a:p>
+            <a:r>
+              <a:rPr lang="hu-HU" dirty="0" err="1">
+                <a:solidFill>
+                  <a:schemeClr val="bg1"/>
+                </a:solidFill>
+              </a:rPr>
+              <a:t>Zsolti</a:t>
+            </a:r>
+            <a:r>
+              <a:rPr lang="hu-HU" dirty="0">
+                <a:solidFill>
+                  <a:schemeClr val="bg1"/>
+                </a:solidFill>
+              </a:rPr>
+              <a:t> a program kinézetében,</a:t>
+            </a:r>
+          </a:p>
+          <a:p>
+            <a:r>
+              <a:rPr lang="hu-HU" dirty="0">
+                <a:solidFill>
+                  <a:schemeClr val="bg1"/>
+                </a:solidFill>
+              </a:rPr>
+              <a:t>Ádám a program felépítésében és új ötletekben volt nagyszerepe</a:t>
+            </a:r>
+          </a:p>
+        </p:txBody>
+      </p:sp>
+    </p:spTree>
+    <p:extLst>
+      <p:ext uri="{BB962C8B-B14F-4D97-AF65-F5344CB8AC3E}">
+        <p14:creationId xmlns:p14="http://schemas.microsoft.com/office/powerpoint/2010/main" val="3658747036"/>
+      </p:ext>
+    </p:extLst>
+  </p:cSld>
+  <p:clrMapOvr>
+    <a:masterClrMapping/>
+  </p:clrMapOvr>
+</p:sld>
+</file>
+
+<file path=ppt/slides/slide9.xml><?xml version="1.0" encoding="utf-8"?>
+<p:sld xmlns:a="http://schemas.openxmlformats.org/drawingml/2006/main" xmlns:r="http://schemas.openxmlformats.org/officeDocument/2006/relationships" xmlns:p="http://schemas.openxmlformats.org/presentationml/2006/main">
+  <p:cSld>
+    <p:bg>
+      <p:bgPr>
+        <a:solidFill>
+          <a:srgbClr val="1F1F1F"/>
+        </a:solidFill>
+        <a:effectLst/>
+      </p:bgPr>
+    </p:bg>
+    <p:spTree>
+      <p:nvGrpSpPr>
+        <p:cNvPr id="1" name=""/>
+        <p:cNvGrpSpPr/>
+        <p:nvPr/>
+      </p:nvGrpSpPr>
+      <p:grpSpPr>
+        <a:xfrm>
+          <a:off x="0" y="0"/>
+          <a:ext cx="0" cy="0"/>
+          <a:chOff x="0" y="0"/>
+          <a:chExt cx="0" cy="0"/>
+        </a:xfrm>
+      </p:grpSpPr>
+      <p:sp>
+        <p:nvSpPr>
+          <p:cNvPr id="2" name="Cím 1">
+            <a:extLst>
+              <a:ext uri="{FF2B5EF4-FFF2-40B4-BE49-F238E27FC236}">
                 <a16:creationId xmlns:a16="http://schemas.microsoft.com/office/drawing/2014/main" id="{051BECD1-0C14-BD92-334B-9E3268E7038F}"/>
               </a:ext>
             </a:extLst>
@@ -3956,7 +7209,11 @@
           <a:lstStyle/>
           <a:p>
             <a:r>
-              <a:rPr lang="hu-HU" dirty="0"/>
+              <a:rPr lang="hu-HU" dirty="0">
+                <a:solidFill>
+                  <a:schemeClr val="bg1"/>
+                </a:solidFill>
+              </a:rPr>
               <a:t>Köszönjük a figyelmet!</a:t>
             </a:r>
           </a:p>
@@ -3984,15 +7241,27 @@
           <a:lstStyle/>
           <a:p>
             <a:r>
-              <a:rPr lang="hu-HU" dirty="0"/>
+              <a:rPr lang="hu-HU" dirty="0">
+                <a:solidFill>
+                  <a:schemeClr val="bg1"/>
+                </a:solidFill>
+              </a:rPr>
               <a:t>Készítette: Magi Zsolt, </a:t>
             </a:r>
             <a:r>
-              <a:rPr lang="hu-HU" dirty="0" err="1"/>
+              <a:rPr lang="hu-HU" dirty="0" err="1">
+                <a:solidFill>
+                  <a:schemeClr val="bg1"/>
+                </a:solidFill>
+              </a:rPr>
               <a:t>Midecki</a:t>
             </a:r>
             <a:r>
-              <a:rPr lang="hu-HU" dirty="0"/>
+              <a:rPr lang="hu-HU" dirty="0">
+                <a:solidFill>
+                  <a:schemeClr val="bg1"/>
+                </a:solidFill>
+              </a:rPr>
               <a:t> Ádám, Pápa Attila</a:t>
             </a:r>
           </a:p>
@@ -4304,4 +7573,299 @@
     </a:ext>
   </a:extLst>
 </a:theme>
+</file>
+
+<file path=ppt/theme/theme2.xml><?xml version="1.0" encoding="utf-8"?>
+<a:theme xmlns:a="http://schemas.openxmlformats.org/drawingml/2006/main" name="Office-téma">
+  <a:themeElements>
+    <a:clrScheme name="Office">
+      <a:dk1>
+        <a:sysClr val="windowText" lastClr="000000"/>
+      </a:dk1>
+      <a:lt1>
+        <a:sysClr val="window" lastClr="FFFFFF"/>
+      </a:lt1>
+      <a:dk2>
+        <a:srgbClr val="44546A"/>
+      </a:dk2>
+      <a:lt2>
+        <a:srgbClr val="E7E6E6"/>
+      </a:lt2>
+      <a:accent1>
+        <a:srgbClr val="4472C4"/>
+      </a:accent1>
+      <a:accent2>
+        <a:srgbClr val="ED7D31"/>
+      </a:accent2>
+      <a:accent3>
+        <a:srgbClr val="A5A5A5"/>
+      </a:accent3>
+      <a:accent4>
+        <a:srgbClr val="FFC000"/>
+      </a:accent4>
+      <a:accent5>
+        <a:srgbClr val="5B9BD5"/>
+      </a:accent5>
+      <a:accent6>
+        <a:srgbClr val="70AD47"/>
+      </a:accent6>
+      <a:hlink>
+        <a:srgbClr val="0563C1"/>
+      </a:hlink>
+      <a:folHlink>
+        <a:srgbClr val="954F72"/>
+      </a:folHlink>
+    </a:clrScheme>
+    <a:fontScheme name="Office">
+      <a:majorFont>
+        <a:latin typeface="Calibri Light" panose="020F0302020204030204"/>
+        <a:ea typeface=""/>
+        <a:cs typeface=""/>
+        <a:font script="Jpan" typeface="游ゴシック Light"/>
+        <a:font script="Hang" typeface="맑은 고딕"/>
+        <a:font script="Hans" typeface="等线 Light"/>
+        <a:font script="Hant" typeface="新細明體"/>
+        <a:font script="Arab" typeface="Times New Roman"/>
+        <a:font script="Hebr" typeface="Times New Roman"/>
+        <a:font script="Thai" typeface="Angsana New"/>
+        <a:font script="Ethi" typeface="Nyala"/>
+        <a:font script="Beng" typeface="Vrinda"/>
+        <a:font script="Gujr" typeface="Shruti"/>
+        <a:font script="Khmr" typeface="MoolBoran"/>
+        <a:font script="Knda" typeface="Tunga"/>
+        <a:font script="Guru" typeface="Raavi"/>
+        <a:font script="Cans" typeface="Euphemia"/>
+        <a:font script="Cher" typeface="Plantagenet Cherokee"/>
+        <a:font script="Yiii" typeface="Microsoft Yi Baiti"/>
+        <a:font script="Tibt" typeface="Microsoft Himalaya"/>
+        <a:font script="Thaa" typeface="MV Boli"/>
+        <a:font script="Deva" typeface="Mangal"/>
+        <a:font script="Telu" typeface="Gautami"/>
+        <a:font script="Taml" typeface="Latha"/>
+        <a:font script="Syrc" typeface="Estrangelo Edessa"/>
+        <a:font script="Orya" typeface="Kalinga"/>
+        <a:font script="Mlym" typeface="Kartika"/>
+        <a:font script="Laoo" typeface="DokChampa"/>
+        <a:font script="Sinh" typeface="Iskoola Pota"/>
+        <a:font script="Mong" typeface="Mongolian Baiti"/>
+        <a:font script="Viet" typeface="Times New Roman"/>
+        <a:font script="Uigh" typeface="Microsoft Uighur"/>
+        <a:font script="Geor" typeface="Sylfaen"/>
+        <a:font script="Armn" typeface="Arial"/>
+        <a:font script="Bugi" typeface="Leelawadee UI"/>
+        <a:font script="Bopo" typeface="Microsoft JhengHei"/>
+        <a:font script="Java" typeface="Javanese Text"/>
+        <a:font script="Lisu" typeface="Segoe UI"/>
+        <a:font script="Mymr" typeface="Myanmar Text"/>
+        <a:font script="Nkoo" typeface="Ebrima"/>
+        <a:font script="Olck" typeface="Nirmala UI"/>
+        <a:font script="Osma" typeface="Ebrima"/>
+        <a:font script="Phag" typeface="Phagspa"/>
+        <a:font script="Syrn" typeface="Estrangelo Edessa"/>
+        <a:font script="Syrj" typeface="Estrangelo Edessa"/>
+        <a:font script="Syre" typeface="Estrangelo Edessa"/>
+        <a:font script="Sora" typeface="Nirmala UI"/>
+        <a:font script="Tale" typeface="Microsoft Tai Le"/>
+        <a:font script="Talu" typeface="Microsoft New Tai Lue"/>
+        <a:font script="Tfng" typeface="Ebrima"/>
+      </a:majorFont>
+      <a:minorFont>
+        <a:latin typeface="Calibri" panose="020F0502020204030204"/>
+        <a:ea typeface=""/>
+        <a:cs typeface=""/>
+        <a:font script="Jpan" typeface="游ゴシック"/>
+        <a:font script="Hang" typeface="맑은 고딕"/>
+        <a:font script="Hans" typeface="等线"/>
+        <a:font script="Hant" typeface="新細明體"/>
+        <a:font script="Arab" typeface="Arial"/>
+        <a:font script="Hebr" typeface="Arial"/>
+        <a:font script="Thai" typeface="Cordia New"/>
+        <a:font script="Ethi" typeface="Nyala"/>
+        <a:font script="Beng" typeface="Vrinda"/>
+        <a:font script="Gujr" typeface="Shruti"/>
+        <a:font script="Khmr" typeface="DaunPenh"/>
+        <a:font script="Knda" typeface="Tunga"/>
+        <a:font script="Guru" typeface="Raavi"/>
+        <a:font script="Cans" typeface="Euphemia"/>
+        <a:font script="Cher" typeface="Plantagenet Cherokee"/>
+        <a:font script="Yiii" typeface="Microsoft Yi Baiti"/>
+        <a:font script="Tibt" typeface="Microsoft Himalaya"/>
+        <a:font script="Thaa" typeface="MV Boli"/>
+        <a:font script="Deva" typeface="Mangal"/>
+        <a:font script="Telu" typeface="Gautami"/>
+        <a:font script="Taml" typeface="Latha"/>
+        <a:font script="Syrc" typeface="Estrangelo Edessa"/>
+        <a:font script="Orya" typeface="Kalinga"/>
+        <a:font script="Mlym" typeface="Kartika"/>
+        <a:font script="Laoo" typeface="DokChampa"/>
+        <a:font script="Sinh" typeface="Iskoola Pota"/>
+        <a:font script="Mong" typeface="Mongolian Baiti"/>
+        <a:font script="Viet" typeface="Arial"/>
+        <a:font script="Uigh" typeface="Microsoft Uighur"/>
+        <a:font script="Geor" typeface="Sylfaen"/>
+        <a:font script="Armn" typeface="Arial"/>
+        <a:font script="Bugi" typeface="Leelawadee UI"/>
+        <a:font script="Bopo" typeface="Microsoft JhengHei"/>
+        <a:font script="Java" typeface="Javanese Text"/>
+        <a:font script="Lisu" typeface="Segoe UI"/>
+        <a:font script="Mymr" typeface="Myanmar Text"/>
+        <a:font script="Nkoo" typeface="Ebrima"/>
+        <a:font script="Olck" typeface="Nirmala UI"/>
+        <a:font script="Osma" typeface="Ebrima"/>
+        <a:font script="Phag" typeface="Phagspa"/>
+        <a:font script="Syrn" typeface="Estrangelo Edessa"/>
+        <a:font script="Syrj" typeface="Estrangelo Edessa"/>
+        <a:font script="Syre" typeface="Estrangelo Edessa"/>
+        <a:font script="Sora" typeface="Nirmala UI"/>
+        <a:font script="Tale" typeface="Microsoft Tai Le"/>
+        <a:font script="Talu" typeface="Microsoft New Tai Lue"/>
+        <a:font script="Tfng" typeface="Ebrima"/>
+      </a:minorFont>
+    </a:fontScheme>
+    <a:fmtScheme name="Office">
+      <a:fillStyleLst>
+        <a:solidFill>
+          <a:schemeClr val="phClr"/>
+        </a:solidFill>
+        <a:gradFill rotWithShape="1">
+          <a:gsLst>
+            <a:gs pos="0">
+              <a:schemeClr val="phClr">
+                <a:lumMod val="110000"/>
+                <a:satMod val="105000"/>
+                <a:tint val="67000"/>
+              </a:schemeClr>
+            </a:gs>
+            <a:gs pos="50000">
+              <a:schemeClr val="phClr">
+                <a:lumMod val="105000"/>
+                <a:satMod val="103000"/>
+                <a:tint val="73000"/>
+              </a:schemeClr>
+            </a:gs>
+            <a:gs pos="100000">
+              <a:schemeClr val="phClr">
+                <a:lumMod val="105000"/>
+                <a:satMod val="109000"/>
+                <a:tint val="81000"/>
+              </a:schemeClr>
+            </a:gs>
+          </a:gsLst>
+          <a:lin ang="5400000" scaled="0"/>
+        </a:gradFill>
+        <a:gradFill rotWithShape="1">
+          <a:gsLst>
+            <a:gs pos="0">
+              <a:schemeClr val="phClr">
+                <a:satMod val="103000"/>
+                <a:lumMod val="102000"/>
+                <a:tint val="94000"/>
+              </a:schemeClr>
+            </a:gs>
+            <a:gs pos="50000">
+              <a:schemeClr val="phClr">
+                <a:satMod val="110000"/>
+                <a:lumMod val="100000"/>
+                <a:shade val="100000"/>
+              </a:schemeClr>
+            </a:gs>
+            <a:gs pos="100000">
+              <a:schemeClr val="phClr">
+                <a:lumMod val="99000"/>
+                <a:satMod val="120000"/>
+                <a:shade val="78000"/>
+              </a:schemeClr>
+            </a:gs>
+          </a:gsLst>
+          <a:lin ang="5400000" scaled="0"/>
+        </a:gradFill>
+      </a:fillStyleLst>
+      <a:lnStyleLst>
+        <a:ln w="6350" cap="flat" cmpd="sng" algn="ctr">
+          <a:solidFill>
+            <a:schemeClr val="phClr"/>
+          </a:solidFill>
+          <a:prstDash val="solid"/>
+          <a:miter lim="800000"/>
+        </a:ln>
+        <a:ln w="12700" cap="flat" cmpd="sng" algn="ctr">
+          <a:solidFill>
+            <a:schemeClr val="phClr"/>
+          </a:solidFill>
+          <a:prstDash val="solid"/>
+          <a:miter lim="800000"/>
+        </a:ln>
+        <a:ln w="19050" cap="flat" cmpd="sng" algn="ctr">
+          <a:solidFill>
+            <a:schemeClr val="phClr"/>
+          </a:solidFill>
+          <a:prstDash val="solid"/>
+          <a:miter lim="800000"/>
+        </a:ln>
+      </a:lnStyleLst>
+      <a:effectStyleLst>
+        <a:effectStyle>
+          <a:effectLst/>
+        </a:effectStyle>
+        <a:effectStyle>
+          <a:effectLst/>
+        </a:effectStyle>
+        <a:effectStyle>
+          <a:effectLst>
+            <a:outerShdw blurRad="57150" dist="19050" dir="5400000" algn="ctr" rotWithShape="0">
+              <a:srgbClr val="000000">
+                <a:alpha val="63000"/>
+              </a:srgbClr>
+            </a:outerShdw>
+          </a:effectLst>
+        </a:effectStyle>
+      </a:effectStyleLst>
+      <a:bgFillStyleLst>
+        <a:solidFill>
+          <a:schemeClr val="phClr"/>
+        </a:solidFill>
+        <a:solidFill>
+          <a:schemeClr val="phClr">
+            <a:tint val="95000"/>
+            <a:satMod val="170000"/>
+          </a:schemeClr>
+        </a:solidFill>
+        <a:gradFill rotWithShape="1">
+          <a:gsLst>
+            <a:gs pos="0">
+              <a:schemeClr val="phClr">
+                <a:tint val="93000"/>
+                <a:satMod val="150000"/>
+                <a:shade val="98000"/>
+                <a:lumMod val="102000"/>
+              </a:schemeClr>
+            </a:gs>
+            <a:gs pos="50000">
+              <a:schemeClr val="phClr">
+                <a:tint val="98000"/>
+                <a:satMod val="130000"/>
+                <a:shade val="90000"/>
+                <a:lumMod val="103000"/>
+              </a:schemeClr>
+            </a:gs>
+            <a:gs pos="100000">
+              <a:schemeClr val="phClr">
+                <a:shade val="63000"/>
+                <a:satMod val="120000"/>
+              </a:schemeClr>
+            </a:gs>
+          </a:gsLst>
+          <a:lin ang="5400000" scaled="0"/>
+        </a:gradFill>
+      </a:bgFillStyleLst>
+    </a:fmtScheme>
+  </a:themeElements>
+  <a:objectDefaults/>
+  <a:extraClrSchemeLst/>
+  <a:extLst>
+    <a:ext uri="{05A4C25C-085E-4340-85A3-A5531E510DB2}">
+      <thm15:themeFamily xmlns:thm15="http://schemas.microsoft.com/office/thememl/2012/main" name="Office Theme" id="{62F939B6-93AF-4DB8-9C6B-D6C7DFDC589F}" vid="{4A3C46E8-61CC-4603-A589-7422A47A8E4A}"/>
+    </a:ext>
+  </a:extLst>
+</a:theme>
 </file>
</xml_diff>